<commit_message>
Corrige apresentações - logo em cada slide (Aulas 03-30)
Problema: apresentações não abriam (logo apenas no master)
Solução: logo incorporado individualmente em cada slide

🤖 Generated with [Claude Code](https://claude.com/claude-code)

Co-Authored-By: Claude Opus 4.5 <noreply@anthropic.com>
</commit_message>
<xml_diff>
--- a/apresentacoes/foco-produtividade/aula-03-quatro-premissas.pptx
+++ b/apresentacoes/foco-produtividade/aula-03-quatro-premissas.pptx
@@ -1286,62 +1286,6 @@
 </p:sldLayout>
 </file>
 
-<file path=ppt/slideLayouts/slideLayout2.xml><?xml version="1.0" encoding="utf-8"?>
-<p:sldLayout xmlns:a="http://schemas.openxmlformats.org/drawingml/2006/main" xmlns:r="http://schemas.openxmlformats.org/officeDocument/2006/relationships" xmlns:p="http://schemas.openxmlformats.org/presentationml/2006/main" preserve="1">
-  <p:cSld name="MASTER">
-    <p:bg>
-      <p:bgPr>
-        <a:solidFill>
-          <a:srgbClr val="1A1A2E"/>
-        </a:solidFill>
-      </p:bgPr>
-    </p:bg>
-    <p:spTree>
-      <p:nvGrpSpPr>
-        <p:cNvPr id="1" name=""/>
-        <p:cNvGrpSpPr/>
-        <p:nvPr/>
-      </p:nvGrpSpPr>
-      <p:grpSpPr>
-        <a:xfrm>
-          <a:off x="0" y="0"/>
-          <a:ext cx="0" cy="0"/>
-          <a:chOff x="0" y="0"/>
-          <a:chExt cx="0" cy="0"/>
-        </a:xfrm>
-      </p:grpSpPr>
-      <p:pic>
-        <p:nvPicPr>
-          <p:cNvPr id="2" name="Image 0" descr="preencoded.png">    </p:cNvPr>
-          <p:cNvPicPr>
-            <a:picLocks noChangeAspect="1"/>
-          </p:cNvPicPr>
-          <p:nvPr/>
-        </p:nvPicPr>
-        <p:blipFill>
-          <a:blip r:embed="rId1"/>
-          <a:stretch>
-            <a:fillRect/>
-          </a:stretch>
-        </p:blipFill>
-        <p:spPr>
-          <a:xfrm>
-            <a:off x="274320" y="182880"/>
-            <a:ext cx="1097280" cy="457200"/>
-          </a:xfrm>
-          <a:prstGeom prst="rect">
-            <a:avLst/>
-          </a:prstGeom>
-        </p:spPr>
-      </p:pic>
-    </p:spTree>
-  </p:cSld>
-  <p:clrMapOvr>
-    <a:masterClrMapping/>
-  </p:clrMapOvr>
-</p:sldLayout>
-</file>
-
 <file path=ppt/slideMasters/slideMaster1.xml><?xml version="1.0" encoding="utf-8"?>
 <p:sldMaster xmlns:a="http://schemas.openxmlformats.org/drawingml/2006/main" xmlns:r="http://schemas.openxmlformats.org/officeDocument/2006/relationships" xmlns:p="http://schemas.openxmlformats.org/presentationml/2006/main">
   <p:cSld>
@@ -1364,7 +1308,6 @@
   <p:clrMap bg1="lt1" tx1="dk1" bg2="lt2" tx2="dk2" accent1="accent1" accent2="accent2" accent3="accent3" accent4="accent4" accent5="accent5" accent6="accent6" hlink="hlink" folHlink="folHlink"/>
   <p:sldLayoutIdLst>
     <p:sldLayoutId id="2147483649" r:id="rId1"/>
-    <p:sldLayoutId id="2147483650" r:id="rId2"/>
   </p:sldLayoutIdLst>
   <p:hf sldNum="0" hdr="0" ftr="0" dt="0"/>
   <p:txStyles>
@@ -1623,6 +1566,13 @@
 <file path=ppt/slides/slide1.xml><?xml version="1.0" encoding="utf-8"?>
 <p:sld xmlns:a="http://schemas.openxmlformats.org/drawingml/2006/main" xmlns:r="http://schemas.openxmlformats.org/officeDocument/2006/relationships" xmlns:p="http://schemas.openxmlformats.org/presentationml/2006/main">
   <p:cSld name="Slide 1">
+    <p:bg>
+      <p:bgPr>
+        <a:solidFill>
+          <a:srgbClr val="1A1A2E"/>
+        </a:solidFill>
+      </p:bgPr>
+    </p:bg>
     <p:spTree>
       <p:nvGrpSpPr>
         <p:cNvPr id="1" name=""/>
@@ -1637,9 +1587,33 @@
           <a:chExt cx="0" cy="0"/>
         </a:xfrm>
       </p:grpSpPr>
-      <p:sp>
-        <p:nvSpPr>
-          <p:cNvPr id="2" name="Shape 0"/>
+      <p:pic>
+        <p:nvPicPr>
+          <p:cNvPr id="2" name="Image 0" descr="preencoded.png">    </p:cNvPr>
+          <p:cNvPicPr>
+            <a:picLocks noChangeAspect="1"/>
+          </p:cNvPicPr>
+          <p:nvPr/>
+        </p:nvPicPr>
+        <p:blipFill>
+          <a:blip r:embed="rId1"/>
+          <a:stretch>
+            <a:fillRect/>
+          </a:stretch>
+        </p:blipFill>
+        <p:spPr>
+          <a:xfrm>
+            <a:off x="274320" y="137160"/>
+            <a:ext cx="1097280" cy="457200"/>
+          </a:xfrm>
+          <a:prstGeom prst="rect">
+            <a:avLst/>
+          </a:prstGeom>
+        </p:spPr>
+      </p:pic>
+      <p:sp>
+        <p:nvSpPr>
+          <p:cNvPr id="3" name="Shape 0"/>
           <p:cNvSpPr/>
           <p:nvPr/>
         </p:nvSpPr>
@@ -1659,7 +1633,7 @@
       </p:sp>
       <p:sp>
         <p:nvSpPr>
-          <p:cNvPr id="3" name="Text 1"/>
+          <p:cNvPr id="4" name="Text 1"/>
           <p:cNvSpPr/>
           <p:nvPr/>
         </p:nvSpPr>
@@ -1698,7 +1672,7 @@
       </p:sp>
       <p:sp>
         <p:nvSpPr>
-          <p:cNvPr id="4" name="Text 2"/>
+          <p:cNvPr id="5" name="Text 2"/>
           <p:cNvSpPr/>
           <p:nvPr/>
         </p:nvSpPr>
@@ -1737,7 +1711,7 @@
       </p:sp>
       <p:sp>
         <p:nvSpPr>
-          <p:cNvPr id="5" name="Text 3"/>
+          <p:cNvPr id="6" name="Text 3"/>
           <p:cNvSpPr/>
           <p:nvPr/>
         </p:nvSpPr>
@@ -1776,7 +1750,7 @@
       </p:sp>
       <p:sp>
         <p:nvSpPr>
-          <p:cNvPr id="6" name="Text 4"/>
+          <p:cNvPr id="7" name="Text 4"/>
           <p:cNvSpPr/>
           <p:nvPr/>
         </p:nvSpPr>
@@ -1815,7 +1789,7 @@
       </p:sp>
       <p:sp>
         <p:nvSpPr>
-          <p:cNvPr id="7" name="Shape 5"/>
+          <p:cNvPr id="8" name="Shape 5"/>
           <p:cNvSpPr/>
           <p:nvPr/>
         </p:nvSpPr>
@@ -1844,6 +1818,13 @@
 <file path=ppt/slides/slide2.xml><?xml version="1.0" encoding="utf-8"?>
 <p:sld xmlns:a="http://schemas.openxmlformats.org/drawingml/2006/main" xmlns:r="http://schemas.openxmlformats.org/officeDocument/2006/relationships" xmlns:p="http://schemas.openxmlformats.org/presentationml/2006/main">
   <p:cSld name="Slide 2">
+    <p:bg>
+      <p:bgPr>
+        <a:solidFill>
+          <a:srgbClr val="1A1A2E"/>
+        </a:solidFill>
+      </p:bgPr>
+    </p:bg>
     <p:spTree>
       <p:nvGrpSpPr>
         <p:cNvPr id="1" name=""/>
@@ -1858,9 +1839,33 @@
           <a:chExt cx="0" cy="0"/>
         </a:xfrm>
       </p:grpSpPr>
-      <p:sp>
-        <p:nvSpPr>
-          <p:cNvPr id="2" name="Shape 0"/>
+      <p:pic>
+        <p:nvPicPr>
+          <p:cNvPr id="2" name="Image 0" descr="preencoded.png">    </p:cNvPr>
+          <p:cNvPicPr>
+            <a:picLocks noChangeAspect="1"/>
+          </p:cNvPicPr>
+          <p:nvPr/>
+        </p:nvPicPr>
+        <p:blipFill>
+          <a:blip r:embed="rId1"/>
+          <a:stretch>
+            <a:fillRect/>
+          </a:stretch>
+        </p:blipFill>
+        <p:spPr>
+          <a:xfrm>
+            <a:off x="274320" y="137160"/>
+            <a:ext cx="1097280" cy="457200"/>
+          </a:xfrm>
+          <a:prstGeom prst="rect">
+            <a:avLst/>
+          </a:prstGeom>
+        </p:spPr>
+      </p:pic>
+      <p:sp>
+        <p:nvSpPr>
+          <p:cNvPr id="3" name="Shape 0"/>
           <p:cNvSpPr/>
           <p:nvPr/>
         </p:nvSpPr>
@@ -1880,7 +1885,7 @@
       </p:sp>
       <p:sp>
         <p:nvSpPr>
-          <p:cNvPr id="3" name="Text 1"/>
+          <p:cNvPr id="4" name="Text 1"/>
           <p:cNvSpPr/>
           <p:nvPr/>
         </p:nvSpPr>
@@ -1919,7 +1924,7 @@
       </p:sp>
       <p:sp>
         <p:nvSpPr>
-          <p:cNvPr id="4" name="Text 2"/>
+          <p:cNvPr id="5" name="Text 2"/>
           <p:cNvSpPr/>
           <p:nvPr/>
         </p:nvSpPr>
@@ -1960,7 +1965,7 @@
       </p:sp>
       <p:sp>
         <p:nvSpPr>
-          <p:cNvPr id="5" name="Text 3"/>
+          <p:cNvPr id="6" name="Text 3"/>
           <p:cNvSpPr/>
           <p:nvPr/>
         </p:nvSpPr>
@@ -1999,7 +2004,7 @@
       </p:sp>
       <p:sp>
         <p:nvSpPr>
-          <p:cNvPr id="6" name="Text 4"/>
+          <p:cNvPr id="7" name="Text 4"/>
           <p:cNvSpPr/>
           <p:nvPr/>
         </p:nvSpPr>
@@ -2040,7 +2045,7 @@
       </p:sp>
       <p:sp>
         <p:nvSpPr>
-          <p:cNvPr id="7" name="Text 5"/>
+          <p:cNvPr id="8" name="Text 5"/>
           <p:cNvSpPr/>
           <p:nvPr/>
         </p:nvSpPr>
@@ -2079,7 +2084,7 @@
       </p:sp>
       <p:sp>
         <p:nvSpPr>
-          <p:cNvPr id="8" name="Text 6"/>
+          <p:cNvPr id="9" name="Text 6"/>
           <p:cNvSpPr/>
           <p:nvPr/>
         </p:nvSpPr>
@@ -2120,7 +2125,7 @@
       </p:sp>
       <p:sp>
         <p:nvSpPr>
-          <p:cNvPr id="9" name="Text 7"/>
+          <p:cNvPr id="10" name="Text 7"/>
           <p:cNvSpPr/>
           <p:nvPr/>
         </p:nvSpPr>
@@ -2168,6 +2173,13 @@
 <file path=ppt/slides/slide3.xml><?xml version="1.0" encoding="utf-8"?>
 <p:sld xmlns:a="http://schemas.openxmlformats.org/drawingml/2006/main" xmlns:r="http://schemas.openxmlformats.org/officeDocument/2006/relationships" xmlns:p="http://schemas.openxmlformats.org/presentationml/2006/main">
   <p:cSld name="Slide 3">
+    <p:bg>
+      <p:bgPr>
+        <a:solidFill>
+          <a:srgbClr val="1A1A2E"/>
+        </a:solidFill>
+      </p:bgPr>
+    </p:bg>
     <p:spTree>
       <p:nvGrpSpPr>
         <p:cNvPr id="1" name=""/>
@@ -2182,9 +2194,33 @@
           <a:chExt cx="0" cy="0"/>
         </a:xfrm>
       </p:grpSpPr>
-      <p:sp>
-        <p:nvSpPr>
-          <p:cNvPr id="2" name="Shape 0"/>
+      <p:pic>
+        <p:nvPicPr>
+          <p:cNvPr id="2" name="Image 0" descr="preencoded.png">    </p:cNvPr>
+          <p:cNvPicPr>
+            <a:picLocks noChangeAspect="1"/>
+          </p:cNvPicPr>
+          <p:nvPr/>
+        </p:nvPicPr>
+        <p:blipFill>
+          <a:blip r:embed="rId1"/>
+          <a:stretch>
+            <a:fillRect/>
+          </a:stretch>
+        </p:blipFill>
+        <p:spPr>
+          <a:xfrm>
+            <a:off x="274320" y="137160"/>
+            <a:ext cx="1097280" cy="457200"/>
+          </a:xfrm>
+          <a:prstGeom prst="rect">
+            <a:avLst/>
+          </a:prstGeom>
+        </p:spPr>
+      </p:pic>
+      <p:sp>
+        <p:nvSpPr>
+          <p:cNvPr id="3" name="Shape 0"/>
           <p:cNvSpPr/>
           <p:nvPr/>
         </p:nvSpPr>
@@ -2204,7 +2240,7 @@
       </p:sp>
       <p:sp>
         <p:nvSpPr>
-          <p:cNvPr id="3" name="Text 1"/>
+          <p:cNvPr id="4" name="Text 1"/>
           <p:cNvSpPr/>
           <p:nvPr/>
         </p:nvSpPr>
@@ -2243,7 +2279,7 @@
       </p:sp>
       <p:sp>
         <p:nvSpPr>
-          <p:cNvPr id="4" name="Text 2"/>
+          <p:cNvPr id="5" name="Text 2"/>
           <p:cNvSpPr/>
           <p:nvPr/>
         </p:nvSpPr>
@@ -2282,7 +2318,7 @@
       </p:sp>
       <p:sp>
         <p:nvSpPr>
-          <p:cNvPr id="5" name="Text 3"/>
+          <p:cNvPr id="6" name="Text 3"/>
           <p:cNvSpPr/>
           <p:nvPr/>
         </p:nvSpPr>
@@ -2321,7 +2357,7 @@
       </p:sp>
       <p:sp>
         <p:nvSpPr>
-          <p:cNvPr id="6" name="Text 4"/>
+          <p:cNvPr id="7" name="Text 4"/>
           <p:cNvSpPr/>
           <p:nvPr/>
         </p:nvSpPr>
@@ -2360,7 +2396,7 @@
       </p:sp>
       <p:sp>
         <p:nvSpPr>
-          <p:cNvPr id="7" name="Text 5"/>
+          <p:cNvPr id="8" name="Text 5"/>
           <p:cNvSpPr/>
           <p:nvPr/>
         </p:nvSpPr>
@@ -2399,7 +2435,7 @@
       </p:sp>
       <p:sp>
         <p:nvSpPr>
-          <p:cNvPr id="8" name="Text 6"/>
+          <p:cNvPr id="9" name="Text 6"/>
           <p:cNvSpPr/>
           <p:nvPr/>
         </p:nvSpPr>
@@ -2438,7 +2474,7 @@
       </p:sp>
       <p:sp>
         <p:nvSpPr>
-          <p:cNvPr id="9" name="Text 7"/>
+          <p:cNvPr id="10" name="Text 7"/>
           <p:cNvSpPr/>
           <p:nvPr/>
         </p:nvSpPr>
@@ -2486,6 +2522,13 @@
 <file path=ppt/slides/slide4.xml><?xml version="1.0" encoding="utf-8"?>
 <p:sld xmlns:a="http://schemas.openxmlformats.org/drawingml/2006/main" xmlns:r="http://schemas.openxmlformats.org/officeDocument/2006/relationships" xmlns:p="http://schemas.openxmlformats.org/presentationml/2006/main">
   <p:cSld name="Slide 4">
+    <p:bg>
+      <p:bgPr>
+        <a:solidFill>
+          <a:srgbClr val="1A1A2E"/>
+        </a:solidFill>
+      </p:bgPr>
+    </p:bg>
     <p:spTree>
       <p:nvGrpSpPr>
         <p:cNvPr id="1" name=""/>
@@ -2500,9 +2543,33 @@
           <a:chExt cx="0" cy="0"/>
         </a:xfrm>
       </p:grpSpPr>
-      <p:sp>
-        <p:nvSpPr>
-          <p:cNvPr id="2" name="Shape 0"/>
+      <p:pic>
+        <p:nvPicPr>
+          <p:cNvPr id="2" name="Image 0" descr="preencoded.png">    </p:cNvPr>
+          <p:cNvPicPr>
+            <a:picLocks noChangeAspect="1"/>
+          </p:cNvPicPr>
+          <p:nvPr/>
+        </p:nvPicPr>
+        <p:blipFill>
+          <a:blip r:embed="rId1"/>
+          <a:stretch>
+            <a:fillRect/>
+          </a:stretch>
+        </p:blipFill>
+        <p:spPr>
+          <a:xfrm>
+            <a:off x="274320" y="137160"/>
+            <a:ext cx="1097280" cy="457200"/>
+          </a:xfrm>
+          <a:prstGeom prst="rect">
+            <a:avLst/>
+          </a:prstGeom>
+        </p:spPr>
+      </p:pic>
+      <p:sp>
+        <p:nvSpPr>
+          <p:cNvPr id="3" name="Shape 0"/>
           <p:cNvSpPr/>
           <p:nvPr/>
         </p:nvSpPr>
@@ -2522,7 +2589,7 @@
       </p:sp>
       <p:sp>
         <p:nvSpPr>
-          <p:cNvPr id="3" name="Text 1"/>
+          <p:cNvPr id="4" name="Text 1"/>
           <p:cNvSpPr/>
           <p:nvPr/>
         </p:nvSpPr>
@@ -2561,7 +2628,7 @@
       </p:sp>
       <p:sp>
         <p:nvSpPr>
-          <p:cNvPr id="4" name="Text 2"/>
+          <p:cNvPr id="5" name="Text 2"/>
           <p:cNvSpPr/>
           <p:nvPr/>
         </p:nvSpPr>
@@ -2600,7 +2667,7 @@
       </p:sp>
       <p:sp>
         <p:nvSpPr>
-          <p:cNvPr id="5" name="Text 3"/>
+          <p:cNvPr id="6" name="Text 3"/>
           <p:cNvSpPr/>
           <p:nvPr/>
         </p:nvSpPr>
@@ -2639,7 +2706,7 @@
       </p:sp>
       <p:sp>
         <p:nvSpPr>
-          <p:cNvPr id="6" name="Text 4"/>
+          <p:cNvPr id="7" name="Text 4"/>
           <p:cNvSpPr/>
           <p:nvPr/>
         </p:nvSpPr>
@@ -2678,7 +2745,7 @@
       </p:sp>
       <p:sp>
         <p:nvSpPr>
-          <p:cNvPr id="7" name="Text 5"/>
+          <p:cNvPr id="8" name="Text 5"/>
           <p:cNvSpPr/>
           <p:nvPr/>
         </p:nvSpPr>
@@ -2717,7 +2784,7 @@
       </p:sp>
       <p:sp>
         <p:nvSpPr>
-          <p:cNvPr id="8" name="Text 6"/>
+          <p:cNvPr id="9" name="Text 6"/>
           <p:cNvSpPr/>
           <p:nvPr/>
         </p:nvSpPr>
@@ -2756,7 +2823,7 @@
       </p:sp>
       <p:sp>
         <p:nvSpPr>
-          <p:cNvPr id="9" name="Text 7"/>
+          <p:cNvPr id="10" name="Text 7"/>
           <p:cNvSpPr/>
           <p:nvPr/>
         </p:nvSpPr>
@@ -2804,6 +2871,13 @@
 <file path=ppt/slides/slide5.xml><?xml version="1.0" encoding="utf-8"?>
 <p:sld xmlns:a="http://schemas.openxmlformats.org/drawingml/2006/main" xmlns:r="http://schemas.openxmlformats.org/officeDocument/2006/relationships" xmlns:p="http://schemas.openxmlformats.org/presentationml/2006/main">
   <p:cSld name="Slide 5">
+    <p:bg>
+      <p:bgPr>
+        <a:solidFill>
+          <a:srgbClr val="1A1A2E"/>
+        </a:solidFill>
+      </p:bgPr>
+    </p:bg>
     <p:spTree>
       <p:nvGrpSpPr>
         <p:cNvPr id="1" name=""/>
@@ -2818,9 +2892,33 @@
           <a:chExt cx="0" cy="0"/>
         </a:xfrm>
       </p:grpSpPr>
-      <p:sp>
-        <p:nvSpPr>
-          <p:cNvPr id="2" name="Shape 0"/>
+      <p:pic>
+        <p:nvPicPr>
+          <p:cNvPr id="2" name="Image 0" descr="preencoded.png">    </p:cNvPr>
+          <p:cNvPicPr>
+            <a:picLocks noChangeAspect="1"/>
+          </p:cNvPicPr>
+          <p:nvPr/>
+        </p:nvPicPr>
+        <p:blipFill>
+          <a:blip r:embed="rId1"/>
+          <a:stretch>
+            <a:fillRect/>
+          </a:stretch>
+        </p:blipFill>
+        <p:spPr>
+          <a:xfrm>
+            <a:off x="274320" y="137160"/>
+            <a:ext cx="1097280" cy="457200"/>
+          </a:xfrm>
+          <a:prstGeom prst="rect">
+            <a:avLst/>
+          </a:prstGeom>
+        </p:spPr>
+      </p:pic>
+      <p:sp>
+        <p:nvSpPr>
+          <p:cNvPr id="3" name="Shape 0"/>
           <p:cNvSpPr/>
           <p:nvPr/>
         </p:nvSpPr>
@@ -2840,7 +2938,7 @@
       </p:sp>
       <p:sp>
         <p:nvSpPr>
-          <p:cNvPr id="3" name="Text 1"/>
+          <p:cNvPr id="4" name="Text 1"/>
           <p:cNvSpPr/>
           <p:nvPr/>
         </p:nvSpPr>
@@ -2879,7 +2977,7 @@
       </p:sp>
       <p:sp>
         <p:nvSpPr>
-          <p:cNvPr id="4" name="Text 2"/>
+          <p:cNvPr id="5" name="Text 2"/>
           <p:cNvSpPr/>
           <p:nvPr/>
         </p:nvSpPr>
@@ -2918,7 +3016,7 @@
       </p:sp>
       <p:sp>
         <p:nvSpPr>
-          <p:cNvPr id="5" name="Text 3"/>
+          <p:cNvPr id="6" name="Text 3"/>
           <p:cNvSpPr/>
           <p:nvPr/>
         </p:nvSpPr>
@@ -2957,7 +3055,7 @@
       </p:sp>
       <p:sp>
         <p:nvSpPr>
-          <p:cNvPr id="6" name="Text 4"/>
+          <p:cNvPr id="7" name="Text 4"/>
           <p:cNvSpPr/>
           <p:nvPr/>
         </p:nvSpPr>
@@ -2996,7 +3094,7 @@
       </p:sp>
       <p:sp>
         <p:nvSpPr>
-          <p:cNvPr id="7" name="Text 5"/>
+          <p:cNvPr id="8" name="Text 5"/>
           <p:cNvSpPr/>
           <p:nvPr/>
         </p:nvSpPr>
@@ -3035,7 +3133,7 @@
       </p:sp>
       <p:sp>
         <p:nvSpPr>
-          <p:cNvPr id="8" name="Text 6"/>
+          <p:cNvPr id="9" name="Text 6"/>
           <p:cNvSpPr/>
           <p:nvPr/>
         </p:nvSpPr>
@@ -3074,7 +3172,7 @@
       </p:sp>
       <p:sp>
         <p:nvSpPr>
-          <p:cNvPr id="9" name="Text 7"/>
+          <p:cNvPr id="10" name="Text 7"/>
           <p:cNvSpPr/>
           <p:nvPr/>
         </p:nvSpPr>
@@ -3122,6 +3220,13 @@
 <file path=ppt/slides/slide6.xml><?xml version="1.0" encoding="utf-8"?>
 <p:sld xmlns:a="http://schemas.openxmlformats.org/drawingml/2006/main" xmlns:r="http://schemas.openxmlformats.org/officeDocument/2006/relationships" xmlns:p="http://schemas.openxmlformats.org/presentationml/2006/main">
   <p:cSld name="Slide 6">
+    <p:bg>
+      <p:bgPr>
+        <a:solidFill>
+          <a:srgbClr val="1A1A2E"/>
+        </a:solidFill>
+      </p:bgPr>
+    </p:bg>
     <p:spTree>
       <p:nvGrpSpPr>
         <p:cNvPr id="1" name=""/>
@@ -3136,9 +3241,33 @@
           <a:chExt cx="0" cy="0"/>
         </a:xfrm>
       </p:grpSpPr>
-      <p:sp>
-        <p:nvSpPr>
-          <p:cNvPr id="2" name="Shape 0"/>
+      <p:pic>
+        <p:nvPicPr>
+          <p:cNvPr id="2" name="Image 0" descr="preencoded.png">    </p:cNvPr>
+          <p:cNvPicPr>
+            <a:picLocks noChangeAspect="1"/>
+          </p:cNvPicPr>
+          <p:nvPr/>
+        </p:nvPicPr>
+        <p:blipFill>
+          <a:blip r:embed="rId1"/>
+          <a:stretch>
+            <a:fillRect/>
+          </a:stretch>
+        </p:blipFill>
+        <p:spPr>
+          <a:xfrm>
+            <a:off x="274320" y="137160"/>
+            <a:ext cx="1097280" cy="457200"/>
+          </a:xfrm>
+          <a:prstGeom prst="rect">
+            <a:avLst/>
+          </a:prstGeom>
+        </p:spPr>
+      </p:pic>
+      <p:sp>
+        <p:nvSpPr>
+          <p:cNvPr id="3" name="Shape 0"/>
           <p:cNvSpPr/>
           <p:nvPr/>
         </p:nvSpPr>
@@ -3158,7 +3287,7 @@
       </p:sp>
       <p:sp>
         <p:nvSpPr>
-          <p:cNvPr id="3" name="Text 1"/>
+          <p:cNvPr id="4" name="Text 1"/>
           <p:cNvSpPr/>
           <p:nvPr/>
         </p:nvSpPr>
@@ -3197,7 +3326,7 @@
       </p:sp>
       <p:sp>
         <p:nvSpPr>
-          <p:cNvPr id="4" name="Text 2"/>
+          <p:cNvPr id="5" name="Text 2"/>
           <p:cNvSpPr/>
           <p:nvPr/>
         </p:nvSpPr>
@@ -3236,7 +3365,7 @@
       </p:sp>
       <p:sp>
         <p:nvSpPr>
-          <p:cNvPr id="5" name="Text 3"/>
+          <p:cNvPr id="6" name="Text 3"/>
           <p:cNvSpPr/>
           <p:nvPr/>
         </p:nvSpPr>
@@ -3275,7 +3404,7 @@
       </p:sp>
       <p:sp>
         <p:nvSpPr>
-          <p:cNvPr id="6" name="Text 4"/>
+          <p:cNvPr id="7" name="Text 4"/>
           <p:cNvSpPr/>
           <p:nvPr/>
         </p:nvSpPr>
@@ -3314,7 +3443,7 @@
       </p:sp>
       <p:sp>
         <p:nvSpPr>
-          <p:cNvPr id="7" name="Text 5"/>
+          <p:cNvPr id="8" name="Text 5"/>
           <p:cNvSpPr/>
           <p:nvPr/>
         </p:nvSpPr>
@@ -3353,7 +3482,7 @@
       </p:sp>
       <p:sp>
         <p:nvSpPr>
-          <p:cNvPr id="8" name="Text 6"/>
+          <p:cNvPr id="9" name="Text 6"/>
           <p:cNvSpPr/>
           <p:nvPr/>
         </p:nvSpPr>
@@ -3392,7 +3521,7 @@
       </p:sp>
       <p:sp>
         <p:nvSpPr>
-          <p:cNvPr id="9" name="Text 7"/>
+          <p:cNvPr id="10" name="Text 7"/>
           <p:cNvSpPr/>
           <p:nvPr/>
         </p:nvSpPr>
@@ -3440,6 +3569,13 @@
 <file path=ppt/slides/slide7.xml><?xml version="1.0" encoding="utf-8"?>
 <p:sld xmlns:a="http://schemas.openxmlformats.org/drawingml/2006/main" xmlns:r="http://schemas.openxmlformats.org/officeDocument/2006/relationships" xmlns:p="http://schemas.openxmlformats.org/presentationml/2006/main">
   <p:cSld name="Slide 7">
+    <p:bg>
+      <p:bgPr>
+        <a:solidFill>
+          <a:srgbClr val="1A1A2E"/>
+        </a:solidFill>
+      </p:bgPr>
+    </p:bg>
     <p:spTree>
       <p:nvGrpSpPr>
         <p:cNvPr id="1" name=""/>
@@ -3454,9 +3590,33 @@
           <a:chExt cx="0" cy="0"/>
         </a:xfrm>
       </p:grpSpPr>
-      <p:sp>
-        <p:nvSpPr>
-          <p:cNvPr id="2" name="Shape 0"/>
+      <p:pic>
+        <p:nvPicPr>
+          <p:cNvPr id="2" name="Image 0" descr="preencoded.png">    </p:cNvPr>
+          <p:cNvPicPr>
+            <a:picLocks noChangeAspect="1"/>
+          </p:cNvPicPr>
+          <p:nvPr/>
+        </p:nvPicPr>
+        <p:blipFill>
+          <a:blip r:embed="rId1"/>
+          <a:stretch>
+            <a:fillRect/>
+          </a:stretch>
+        </p:blipFill>
+        <p:spPr>
+          <a:xfrm>
+            <a:off x="274320" y="137160"/>
+            <a:ext cx="1097280" cy="457200"/>
+          </a:xfrm>
+          <a:prstGeom prst="rect">
+            <a:avLst/>
+          </a:prstGeom>
+        </p:spPr>
+      </p:pic>
+      <p:sp>
+        <p:nvSpPr>
+          <p:cNvPr id="3" name="Shape 0"/>
           <p:cNvSpPr/>
           <p:nvPr/>
         </p:nvSpPr>
@@ -3476,7 +3636,7 @@
       </p:sp>
       <p:sp>
         <p:nvSpPr>
-          <p:cNvPr id="3" name="Text 1"/>
+          <p:cNvPr id="4" name="Text 1"/>
           <p:cNvSpPr/>
           <p:nvPr/>
         </p:nvSpPr>
@@ -3515,7 +3675,7 @@
       </p:sp>
       <p:sp>
         <p:nvSpPr>
-          <p:cNvPr id="4" name="Text 2"/>
+          <p:cNvPr id="5" name="Text 2"/>
           <p:cNvSpPr/>
           <p:nvPr/>
         </p:nvSpPr>
@@ -3554,7 +3714,7 @@
       </p:sp>
       <p:sp>
         <p:nvSpPr>
-          <p:cNvPr id="5" name="Text 3"/>
+          <p:cNvPr id="6" name="Text 3"/>
           <p:cNvSpPr/>
           <p:nvPr/>
         </p:nvSpPr>
@@ -3593,7 +3753,7 @@
       </p:sp>
       <p:sp>
         <p:nvSpPr>
-          <p:cNvPr id="6" name="Text 4"/>
+          <p:cNvPr id="7" name="Text 4"/>
           <p:cNvSpPr/>
           <p:nvPr/>
         </p:nvSpPr>
@@ -3632,7 +3792,7 @@
       </p:sp>
       <p:sp>
         <p:nvSpPr>
-          <p:cNvPr id="7" name="Text 5"/>
+          <p:cNvPr id="8" name="Text 5"/>
           <p:cNvSpPr/>
           <p:nvPr/>
         </p:nvSpPr>
@@ -3671,7 +3831,7 @@
       </p:sp>
       <p:sp>
         <p:nvSpPr>
-          <p:cNvPr id="8" name="Text 6"/>
+          <p:cNvPr id="9" name="Text 6"/>
           <p:cNvSpPr/>
           <p:nvPr/>
         </p:nvSpPr>
@@ -3710,7 +3870,7 @@
       </p:sp>
       <p:sp>
         <p:nvSpPr>
-          <p:cNvPr id="9" name="Text 7"/>
+          <p:cNvPr id="10" name="Text 7"/>
           <p:cNvSpPr/>
           <p:nvPr/>
         </p:nvSpPr>
@@ -3749,7 +3909,7 @@
       </p:sp>
       <p:sp>
         <p:nvSpPr>
-          <p:cNvPr id="10" name="Text 8"/>
+          <p:cNvPr id="11" name="Text 8"/>
           <p:cNvSpPr/>
           <p:nvPr/>
         </p:nvSpPr>
@@ -3788,7 +3948,7 @@
       </p:sp>
       <p:sp>
         <p:nvSpPr>
-          <p:cNvPr id="11" name="Text 9"/>
+          <p:cNvPr id="12" name="Text 9"/>
           <p:cNvSpPr/>
           <p:nvPr/>
         </p:nvSpPr>
@@ -3836,6 +3996,13 @@
 <file path=ppt/slides/slide8.xml><?xml version="1.0" encoding="utf-8"?>
 <p:sld xmlns:a="http://schemas.openxmlformats.org/drawingml/2006/main" xmlns:r="http://schemas.openxmlformats.org/officeDocument/2006/relationships" xmlns:p="http://schemas.openxmlformats.org/presentationml/2006/main">
   <p:cSld name="Slide 8">
+    <p:bg>
+      <p:bgPr>
+        <a:solidFill>
+          <a:srgbClr val="1A1A2E"/>
+        </a:solidFill>
+      </p:bgPr>
+    </p:bg>
     <p:spTree>
       <p:nvGrpSpPr>
         <p:cNvPr id="1" name=""/>
@@ -3850,9 +4017,33 @@
           <a:chExt cx="0" cy="0"/>
         </a:xfrm>
       </p:grpSpPr>
-      <p:sp>
-        <p:nvSpPr>
-          <p:cNvPr id="2" name="Shape 0"/>
+      <p:pic>
+        <p:nvPicPr>
+          <p:cNvPr id="2" name="Image 0" descr="preencoded.png">    </p:cNvPr>
+          <p:cNvPicPr>
+            <a:picLocks noChangeAspect="1"/>
+          </p:cNvPicPr>
+          <p:nvPr/>
+        </p:nvPicPr>
+        <p:blipFill>
+          <a:blip r:embed="rId1"/>
+          <a:stretch>
+            <a:fillRect/>
+          </a:stretch>
+        </p:blipFill>
+        <p:spPr>
+          <a:xfrm>
+            <a:off x="274320" y="137160"/>
+            <a:ext cx="1097280" cy="457200"/>
+          </a:xfrm>
+          <a:prstGeom prst="rect">
+            <a:avLst/>
+          </a:prstGeom>
+        </p:spPr>
+      </p:pic>
+      <p:sp>
+        <p:nvSpPr>
+          <p:cNvPr id="3" name="Shape 0"/>
           <p:cNvSpPr/>
           <p:nvPr/>
         </p:nvSpPr>
@@ -3872,7 +4063,7 @@
       </p:sp>
       <p:sp>
         <p:nvSpPr>
-          <p:cNvPr id="3" name="Text 1"/>
+          <p:cNvPr id="4" name="Text 1"/>
           <p:cNvSpPr/>
           <p:nvPr/>
         </p:nvSpPr>
@@ -3911,7 +4102,7 @@
       </p:sp>
       <p:sp>
         <p:nvSpPr>
-          <p:cNvPr id="4" name="Shape 2"/>
+          <p:cNvPr id="5" name="Shape 2"/>
           <p:cNvSpPr/>
           <p:nvPr/>
         </p:nvSpPr>
@@ -3936,7 +4127,7 @@
       </p:sp>
       <p:sp>
         <p:nvSpPr>
-          <p:cNvPr id="5" name="Text 3"/>
+          <p:cNvPr id="6" name="Text 3"/>
           <p:cNvSpPr/>
           <p:nvPr/>
         </p:nvSpPr>
@@ -3975,7 +4166,7 @@
       </p:sp>
       <p:sp>
         <p:nvSpPr>
-          <p:cNvPr id="6" name="Text 4"/>
+          <p:cNvPr id="7" name="Text 4"/>
           <p:cNvSpPr/>
           <p:nvPr/>
         </p:nvSpPr>
@@ -4023,6 +4214,13 @@
 <file path=ppt/slides/slide9.xml><?xml version="1.0" encoding="utf-8"?>
 <p:sld xmlns:a="http://schemas.openxmlformats.org/drawingml/2006/main" xmlns:r="http://schemas.openxmlformats.org/officeDocument/2006/relationships" xmlns:p="http://schemas.openxmlformats.org/presentationml/2006/main">
   <p:cSld name="Slide 9">
+    <p:bg>
+      <p:bgPr>
+        <a:solidFill>
+          <a:srgbClr val="1A1A2E"/>
+        </a:solidFill>
+      </p:bgPr>
+    </p:bg>
     <p:spTree>
       <p:nvGrpSpPr>
         <p:cNvPr id="1" name=""/>
@@ -4037,9 +4235,33 @@
           <a:chExt cx="0" cy="0"/>
         </a:xfrm>
       </p:grpSpPr>
-      <p:sp>
-        <p:nvSpPr>
-          <p:cNvPr id="2" name="Shape 0"/>
+      <p:pic>
+        <p:nvPicPr>
+          <p:cNvPr id="2" name="Image 0" descr="preencoded.png">    </p:cNvPr>
+          <p:cNvPicPr>
+            <a:picLocks noChangeAspect="1"/>
+          </p:cNvPicPr>
+          <p:nvPr/>
+        </p:nvPicPr>
+        <p:blipFill>
+          <a:blip r:embed="rId1"/>
+          <a:stretch>
+            <a:fillRect/>
+          </a:stretch>
+        </p:blipFill>
+        <p:spPr>
+          <a:xfrm>
+            <a:off x="274320" y="137160"/>
+            <a:ext cx="1097280" cy="457200"/>
+          </a:xfrm>
+          <a:prstGeom prst="rect">
+            <a:avLst/>
+          </a:prstGeom>
+        </p:spPr>
+      </p:pic>
+      <p:sp>
+        <p:nvSpPr>
+          <p:cNvPr id="3" name="Shape 0"/>
           <p:cNvSpPr/>
           <p:nvPr/>
         </p:nvSpPr>
@@ -4059,7 +4281,7 @@
       </p:sp>
       <p:sp>
         <p:nvSpPr>
-          <p:cNvPr id="3" name="Text 1"/>
+          <p:cNvPr id="4" name="Text 1"/>
           <p:cNvSpPr/>
           <p:nvPr/>
         </p:nvSpPr>
@@ -4098,7 +4320,7 @@
       </p:sp>
       <p:sp>
         <p:nvSpPr>
-          <p:cNvPr id="4" name="Shape 2"/>
+          <p:cNvPr id="5" name="Shape 2"/>
           <p:cNvSpPr/>
           <p:nvPr/>
         </p:nvSpPr>
@@ -4123,7 +4345,7 @@
       </p:sp>
       <p:sp>
         <p:nvSpPr>
-          <p:cNvPr id="5" name="Text 3"/>
+          <p:cNvPr id="6" name="Text 3"/>
           <p:cNvSpPr/>
           <p:nvPr/>
         </p:nvSpPr>
@@ -4162,7 +4384,7 @@
       </p:sp>
       <p:sp>
         <p:nvSpPr>
-          <p:cNvPr id="6" name="Text 4"/>
+          <p:cNvPr id="7" name="Text 4"/>
           <p:cNvSpPr/>
           <p:nvPr/>
         </p:nvSpPr>
@@ -4201,7 +4423,7 @@
       </p:sp>
       <p:sp>
         <p:nvSpPr>
-          <p:cNvPr id="7" name="Text 5"/>
+          <p:cNvPr id="8" name="Text 5"/>
           <p:cNvSpPr/>
           <p:nvPr/>
         </p:nvSpPr>

</xml_diff>

<commit_message>
Adiciona infográficos e anotações do apresentador às apresentações (aulas 01-30)
Melhorias implementadas em todas as 30 aulas:

1. **Slide de Infográfico**
   - Infográfico SVG convertido para PNG e incorporado no slide
   - Bullet points explicativos ao lado do infográfico
   - Conceitos principais destacados

2. **Anotações do Apresentador (Speaker Notes)**
   - Narrativa em primeira pessoa extraída dos arquivos markdown
   - Slide de título: texto de abertura da aula
   - Slides de tópicos: desenvolvimento detalhado
   - Slide de encerramento: texto de conclusão
   - Facilita gravação das videoaulas

3. **Elementos visuais mantidos**
   - Cards com bordas coloridas
   - Barras de progresso
   - Layout em grid
   - Logo no canto inferior direito

🤖 Generated with [Claude Code](https://claude.com/claude-code)

Co-Authored-By: Claude Opus 4.5 <noreply@anthropic.com>
</commit_message>
<xml_diff>
--- a/apresentacoes/foco-produtividade/aula-03-quatro-premissas.pptx
+++ b/apresentacoes/foco-produtividade/aula-03-quatro-premissas.pptx
@@ -14,9 +14,10 @@
     <p:sldId id="262" r:id="rId8"/>
     <p:sldId id="263" r:id="rId9"/>
     <p:sldId id="264" r:id="rId10"/>
+    <p:sldId id="265" r:id="rId11"/>
   </p:sldIdLst>
   <p:notesMasterIdLst>
-    <p:notesMasterId r:id="rId11"/>
+    <p:notesMasterId r:id="rId12"/>
   </p:notesMasterIdLst>
   <p:sldSz cx="9144000" cy="5143500"/>
   <p:notesSz cx="5143500" cy="9144000"/>
@@ -510,7 +511,10 @@
           <a:p>
             <a:r>
               <a:rPr lang="en-US" dirty="0"/>
-              <a:t/>
+              <a:t>Olá! Que bom ter você aqui na Aula 3. Nas aulas anteriores, definimos o que são hiperfoco e hiperprodutividade. Agora, vamos dar um passo fundamental: entender as Quatro Premissas que governam como nossa atenção funciona.
+Eu chamo essas premissas de "regras do jogo". Quando você joga um jogo sem conhecer as regras, você perde. Mas quando entende as regras, pode jogar de forma estratégica e vencer.
+Com a atenção é a mesma coisa. Muita gente luta contra a própria natureza da mente, fica frustrada, e desiste. Mas quando você aceita como sua mente funciona, pode trabalhar com ela, não contra ela.
+Vamos às quatro premissas.</a:t>
             </a:r>
             <a:endParaRPr lang="en-US" dirty="0"/>
           </a:p>
@@ -534,6 +538,101 @@
             <a:fld id="{F7021451-1387-4CA6-816F-3879F97B5CBC}" type="slidenum">
               <a:rPr lang="en-US"/>
               <a:t>1</a:t>
+            </a:fld>
+            <a:endParaRPr lang="en-US"/>
+          </a:p>
+        </p:txBody>
+      </p:sp>
+    </p:spTree>
+    <p:extLst>
+      <p:ext uri="{BB962C8B-B14F-4D97-AF65-F5344CB8AC3E}">
+        <p14:creationId xmlns:p14="http://schemas.microsoft.com/office/powerpoint/2010/main" val="1024086991"/>
+      </p:ext>
+    </p:extLst>
+  </p:cSld>
+  <p:clrMapOvr>
+    <a:masterClrMapping/>
+  </p:clrMapOvr>
+</p:notes>
+</file>
+
+<file path=ppt/notesSlides/notesSlide10.xml><?xml version="1.0" encoding="utf-8"?>
+<p:notes xmlns:a="http://schemas.openxmlformats.org/drawingml/2006/main" xmlns:r="http://schemas.openxmlformats.org/officeDocument/2006/relationships" xmlns:p="http://schemas.openxmlformats.org/presentationml/2006/main">
+  <p:cSld>
+    <p:spTree>
+      <p:nvGrpSpPr>
+        <p:cNvPr id="1" name=""/>
+        <p:cNvGrpSpPr/>
+        <p:nvPr/>
+      </p:nvGrpSpPr>
+      <p:grpSpPr>
+        <a:xfrm>
+          <a:off x="0" y="0"/>
+          <a:ext cx="0" cy="0"/>
+          <a:chOff x="0" y="0"/>
+          <a:chExt cx="0" cy="0"/>
+        </a:xfrm>
+      </p:grpSpPr>
+      <p:sp>
+        <p:nvSpPr>
+          <p:cNvPr id="2" name="Slide Image Placeholder 1"/>
+          <p:cNvSpPr>
+            <a:spLocks noGrp="1" noRot="1" noChangeAspect="1"/>
+          </p:cNvSpPr>
+          <p:nvPr>
+            <p:ph type="sldImg"/>
+          </p:nvPr>
+        </p:nvSpPr>
+        <p:spPr/>
+      </p:sp>
+      <p:sp>
+        <p:nvSpPr>
+          <p:cNvPr id="3" name="Notes Placeholder 2"/>
+          <p:cNvSpPr>
+            <a:spLocks noGrp="1"/>
+          </p:cNvSpPr>
+          <p:nvPr>
+            <p:ph type="body" idx="1"/>
+          </p:nvPr>
+        </p:nvSpPr>
+        <p:spPr/>
+        <p:txBody>
+          <a:bodyPr/>
+          <a:lstStyle/>
+          <a:p>
+            <a:r>
+              <a:rPr lang="en-US" dirty="0"/>
+              <a:t>Vamos recapitular as quatro premissas:
+1. Sua atenção é limitada - trate-a como recurso precioso
+2. O foco precisa ser intencional - é uma escolha consciente
+3. O ambiente determina seu foco - desenhe-o a seu favor
+4. A mente vagueia naturalmente - não se culpe, apenas redirecione
+A partir de agora, essas premissas vão guiar tudo que você faz em relação aos estudos. Aceite-as, trabalhe com elas, e você vai ver que focar se torna muito mais fácil.
+Na Aula 4, vamos explorar um conceito crucial: a diferença entre Foco Direcionado e Foco Seduzido. Você vai entender por que às vezes parece fácil focar em certas coisas (como redes sociais) mas tão difícil focar em outras (como estudo). E como usar isso a seu favor.
+Agora, sua atividade prática!</a:t>
+            </a:r>
+            <a:endParaRPr lang="en-US" dirty="0"/>
+          </a:p>
+        </p:txBody>
+      </p:sp>
+      <p:sp>
+        <p:nvSpPr>
+          <p:cNvPr id="4" name="Slide Number Placeholder 3"/>
+          <p:cNvSpPr>
+            <a:spLocks noGrp="1"/>
+          </p:cNvSpPr>
+          <p:nvPr>
+            <p:ph type="sldNum" sz="quarter" idx="10"/>
+          </p:nvPr>
+        </p:nvSpPr>
+        <p:spPr/>
+        <p:txBody>
+          <a:bodyPr/>
+          <a:lstStyle/>
+          <a:p>
+            <a:fld id="{F7021451-1387-4CA6-816F-3879F97B5CBC}" type="slidenum">
+              <a:rPr lang="en-US"/>
+              <a:t>10</a:t>
             </a:fld>
             <a:endParaRPr lang="en-US"/>
           </a:p>
@@ -598,7 +697,7 @@
           <a:p>
             <a:r>
               <a:rPr lang="en-US" dirty="0"/>
-              <a:t/>
+              <a:t>Nesta aula, você vai aprender os conceitos principais apresentados nos objetivos. Olá! Que bom ter você aqui na Aula 3. Nas aulas anteriores, definimos o que são hiperfoco e hiperprodutividade. Agora, vamos dar um passo fundamental: entender as Quatro Premissas que governam com</a:t>
             </a:r>
             <a:endParaRPr lang="en-US" dirty="0"/>
           </a:p>
@@ -686,7 +785,13 @@
           <a:p>
             <a:r>
               <a:rPr lang="en-US" dirty="0"/>
-              <a:t/>
+              <a:t>Premissa 1: Sua atenção é limitada
+A primeira premissa é talvez a mais importante: sua atenção é um recurso limitado.
+Imagine sua atenção como um tanque de combustível. Cada vez que você foca em algo, está gastando desse tanque. E aqui está o problema: o tanque é menor do que você imagina.
+Pesquisas mostram que conseguimos manter atenção profunda por no máximo 45 a 90 minutos antes de precisar de uma pausa. Além disso, só conseguimos manter na mente de 3 a 4 coisas ao mesmo tempo.
+E isso nos leva a uma verdade inconveniente: multitarefa é um mito.
+Quando você acha que está fazendo duas coisas ao mesmo tempo, na verdade está alternando rapidamente entre elas. E cada alternância custa energia. O resultado? Você se cansa mais rápido e faz ambas as tarefas pior do que faria se fizesse uma de cada vez.
+Então, primeira lição: trate sua atenção como o recurso precioso que ela é. Não a desperdice com coisas que não importam. Não tente fazer várias coisas ao mesmo tempo. Escolha uma tarefa, dê toda sua atenção a ela, e só depois passe para a próxima.</a:t>
             </a:r>
             <a:endParaRPr lang="en-US" dirty="0"/>
           </a:p>
@@ -774,7 +879,13 @@
           <a:p>
             <a:r>
               <a:rPr lang="en-US" dirty="0"/>
-              <a:t/>
+              <a:t>Premissa 2: O foco precisa ser intencional
+Segunda premissa: o foco não acontece automaticamente - ele precisa ser uma escolha consciente.
+Nosso cérebro evoluiu para buscar novidade. Há milhares de anos, essa característica era essencial para sobrevivência. Um barulho novo poderia ser um predador. Um movimento diferente poderia ser uma oportunidade de caça.
+Mas hoje, essa mesma característica nos sabota. Cada notificação, cada e-mail, cada atualização nas redes sociais ativa esse instinto de buscar novidade. E nosso pobre cérebro, seguindo sua programação ancestral, quer olhar.
+A conclusão? Você não pode esperar que o foco venha naturalmente. Ele não vai vir. Você precisa escolher focar, conscientemente, repetidamente.
+Isso significa que, a cada vez que sua mente quiser pular para outra coisa, você vai ter que dizer "não, agora estou focado nisso". É um esforço intencional. E com prática, fica mais fácil.
+Mas nunca completamente automático. Mesmo pessoas com altíssima capacidade de concentração têm que fazer essa escolha consciente.</a:t>
             </a:r>
             <a:endParaRPr lang="en-US" dirty="0"/>
           </a:p>
@@ -862,7 +973,18 @@
           <a:p>
             <a:r>
               <a:rPr lang="en-US" dirty="0"/>
-              <a:t/>
+              <a:t>Premissa 3: O ambiente determina seu foco
+Terceira premissa: seu ambiente de estudo determina 80% da sua capacidade de focar.
+Você pode ter toda a força de vontade do mundo, mas se estiver estudando com o celular do lado, com a TV ligada, e com pessoas entrando e saindo do quarto, seu foco vai ser constantemente interrompido.
+Por quê? Porque cada estímulo no ambiente é um potencial "sequestrador" da sua atenção. E lembra da premissa 1? Sua atenção é limitada. Se você gastar energia resistindo a distrações, sobra menos energia para o estudo em si.
+A solução não é ter mais força de vontade. A solução é desenhar seu ambiente para que focar seja o caminho de menor resistência.
+Isso significa:
+- Celular em outro cômodo, ou no mínimo no modo avião
+- Notificações do computador desligadas
+- Ambiente organizado, com apenas o material necessário
+- Avisar pessoas ao redor que você está em período de foco
+- Usar fones de ouvido com ruído branco ou música sem letra, se necessário
+Quando o ambiente está a seu favor, focar deixa de ser uma luta constante.</a:t>
             </a:r>
             <a:endParaRPr lang="en-US" dirty="0"/>
           </a:p>
@@ -950,7 +1072,17 @@
           <a:p>
             <a:r>
               <a:rPr lang="en-US" dirty="0"/>
-              <a:t/>
+              <a:t>Premissa 4: A mente vagueia naturalmente
+E a quarta premissa: sua mente vai vaguear, e isso é normal.
+Mesmo nas melhores condições, com o ambiente perfeito e a intenção clara, sua mente vai escapar de vez em quando. Você vai estar lendo um parágrafo e de repente percebe que está pensando no almoço, ou naquela conversa de ontem.
+Isso se chama "mind wandering" - vagueamento mental - e é absolutamente normal. Pesquisas mostram que passamos cerca de 47% do nosso tempo acordado com a mente vagueando.
+Então por favor, não se culpe quando isso acontecer. A culpa não ajuda em nada. Na verdade, atrapalha, porque cria emoções negativas que drenam ainda mais sua energia.
+O que você faz quando percebe que sua mente vagueou é o que importa. Simplesmente:
+1. Note que vagou - sem julgamento
+2. Gentilmente traga o foco de volta
+3. Continue de onde parou
+É isso. Simples assim. E toda vez que você faz isso, está fortalecendo seu "músculo" da atenção.
+Na verdade, no Módulo 2 você vai descobrir que esse vagueamento tem um propósito importante no aprendizado. Mas por enquanto, o importante é: não lute contra ele, apenas redirecione.</a:t>
             </a:r>
             <a:endParaRPr lang="en-US" dirty="0"/>
           </a:p>
@@ -1038,7 +1170,7 @@
           <a:p>
             <a:r>
               <a:rPr lang="en-US" dirty="0"/>
-              <a:t/>
+              <a:t>Resumo dos pontos principais da aula. Atenção limitada = recurso precioso, não desperdice. Foco intencional = escolha consciente, repetida. Ambiente é 80% do sucesso = desenhe a seu favor. Vagueamento é normal = redirecione sem culpa</a:t>
             </a:r>
             <a:endParaRPr lang="en-US" dirty="0"/>
           </a:p>
@@ -1126,7 +1258,7 @@
           <a:p>
             <a:r>
               <a:rPr lang="en-US" dirty="0"/>
-              <a:t/>
+              <a:t>Este infográfico resume visualmente os principais conceitos da aula. Use-o para reforçar o aprendizado. Atenção limitada = recurso precioso, não desperdice. Foco intencional = escolha consciente, repetida. Ambiente é 80% do sucesso = desenhe a seu favor. Vagueamento é normal = redirecione sem culpa</a:t>
             </a:r>
             <a:endParaRPr lang="en-US" dirty="0"/>
           </a:p>
@@ -1214,7 +1346,7 @@
           <a:p>
             <a:r>
               <a:rPr lang="en-US" dirty="0"/>
-              <a:t/>
+              <a:t>Agora é hora da prática!  Esta atividade vai transformar seu espaço de estudo!</a:t>
             </a:r>
             <a:endParaRPr lang="en-US" dirty="0"/>
           </a:p>
@@ -1640,7 +1772,7 @@
                 <a:ea typeface="Arial" pitchFamily="34" charset="-122"/>
                 <a:cs typeface="Arial" pitchFamily="34" charset="-120"/>
               </a:rPr>
-              <a:t>Módulo 1 - Hiperfoco | Bloco: Fundamentos</a:t>
+              <a:t>1 - Hiperfoco e Hiperprodutividade | Bloco: Fundamentos</a:t>
             </a:r>
             <a:endParaRPr lang="en-US" sz="1400" dirty="0"/>
           </a:p>
@@ -1881,7 +2013,7 @@
                 <a:ea typeface="Arial" pitchFamily="34" charset="-122"/>
                 <a:cs typeface="Arial" pitchFamily="34" charset="-120"/>
               </a:rPr>
-              <a:t>⏱ Duração: ~25 min</a:t>
+              <a:t>⏱ Duração: ~25 minutos</a:t>
             </a:r>
             <a:endParaRPr lang="en-US" sz="1100" dirty="0"/>
           </a:p>
@@ -1945,7 +2077,7 @@
                 <a:ea typeface="Arial" pitchFamily="34" charset="-122"/>
                 <a:cs typeface="Arial" pitchFamily="34" charset="-120"/>
               </a:rPr>
-              <a:t>📚 Nível: Intermediário</a:t>
+              <a:t>📚 Nível: Introdutório</a:t>
             </a:r>
             <a:endParaRPr lang="en-US" sz="1100" dirty="0"/>
           </a:p>
@@ -2017,7 +2149,7 @@
       </p:sp>
       <p:pic>
         <p:nvPicPr>
-          <p:cNvPr id="16" name="Image 0" descr="preencoded.png">    </p:cNvPr>
+          <p:cNvPr id="17" name="Image 0" descr="preencoded.png">    </p:cNvPr>
           <p:cNvPicPr>
             <a:picLocks noChangeAspect="1"/>
           </p:cNvPicPr>
@@ -2033,6 +2165,382 @@
           <a:xfrm>
             <a:off x="7498080" y="4389120"/>
             <a:ext cx="1371600" cy="548640"/>
+          </a:xfrm>
+          <a:prstGeom prst="rect">
+            <a:avLst/>
+          </a:prstGeom>
+        </p:spPr>
+      </p:pic>
+    </p:spTree>
+  </p:cSld>
+  <p:clrMapOvr>
+    <a:masterClrMapping/>
+  </p:clrMapOvr>
+</p:sld>
+</file>
+
+<file path=ppt/slides/slide10.xml><?xml version="1.0" encoding="utf-8"?>
+<p:sld xmlns:a="http://schemas.openxmlformats.org/drawingml/2006/main" xmlns:r="http://schemas.openxmlformats.org/officeDocument/2006/relationships" xmlns:p="http://schemas.openxmlformats.org/presentationml/2006/main">
+  <p:cSld name="Slide 10">
+    <p:bg>
+      <p:bgPr>
+        <a:solidFill>
+          <a:srgbClr val="1A1A2E"/>
+        </a:solidFill>
+      </p:bgPr>
+    </p:bg>
+    <p:spTree>
+      <p:nvGrpSpPr>
+        <p:cNvPr id="1" name=""/>
+        <p:cNvGrpSpPr/>
+        <p:nvPr/>
+      </p:nvGrpSpPr>
+      <p:grpSpPr>
+        <a:xfrm>
+          <a:off x="0" y="0"/>
+          <a:ext cx="0" cy="0"/>
+          <a:chOff x="0" y="0"/>
+          <a:chExt cx="0" cy="0"/>
+        </a:xfrm>
+      </p:grpSpPr>
+      <p:sp>
+        <p:nvSpPr>
+          <p:cNvPr id="2" name="Shape 0"/>
+          <p:cNvSpPr/>
+          <p:nvPr/>
+        </p:nvSpPr>
+        <p:spPr>
+          <a:xfrm>
+            <a:off x="0" y="0"/>
+            <a:ext cx="9144000" cy="822960"/>
+          </a:xfrm>
+          <a:prstGeom prst="rect">
+            <a:avLst/>
+          </a:prstGeom>
+          <a:solidFill>
+            <a:srgbClr val="0F172A"/>
+          </a:solidFill>
+          <a:ln/>
+        </p:spPr>
+      </p:sp>
+      <p:sp>
+        <p:nvSpPr>
+          <p:cNvPr id="3" name="Text 1"/>
+          <p:cNvSpPr/>
+          <p:nvPr/>
+        </p:nvSpPr>
+        <p:spPr>
+          <a:xfrm>
+            <a:off x="457200" y="228600"/>
+            <a:ext cx="8229600" cy="457200"/>
+          </a:xfrm>
+          <a:prstGeom prst="rect">
+            <a:avLst/>
+          </a:prstGeom>
+          <a:noFill/>
+          <a:ln/>
+        </p:spPr>
+        <p:txBody>
+          <a:bodyPr wrap="square" rtlCol="0" anchor="ctr"/>
+          <a:lstStyle/>
+          <a:p>
+            <a:pPr indent="0" marL="0">
+              <a:buNone/>
+            </a:pPr>
+            <a:r>
+              <a:rPr lang="en-US" sz="2000" b="1" dirty="0">
+                <a:solidFill>
+                  <a:srgbClr val="FFFFFF"/>
+                </a:solidFill>
+                <a:latin typeface="Arial" pitchFamily="34" charset="0"/>
+                <a:ea typeface="Arial" pitchFamily="34" charset="-122"/>
+                <a:cs typeface="Arial" pitchFamily="34" charset="-120"/>
+              </a:rPr>
+              <a:t>Aula 03 - Encerramento</a:t>
+            </a:r>
+            <a:endParaRPr lang="en-US" sz="2000" dirty="0"/>
+          </a:p>
+        </p:txBody>
+      </p:sp>
+      <p:sp>
+        <p:nvSpPr>
+          <p:cNvPr id="4" name="Shape 2"/>
+          <p:cNvSpPr/>
+          <p:nvPr/>
+        </p:nvSpPr>
+        <p:spPr>
+          <a:xfrm>
+            <a:off x="0" y="822960"/>
+            <a:ext cx="2743200" cy="91440"/>
+          </a:xfrm>
+          <a:prstGeom prst="rect">
+            <a:avLst/>
+          </a:prstGeom>
+          <a:solidFill>
+            <a:srgbClr val="667EEA"/>
+          </a:solidFill>
+          <a:ln/>
+        </p:spPr>
+      </p:sp>
+      <p:sp>
+        <p:nvSpPr>
+          <p:cNvPr id="5" name="Shape 3"/>
+          <p:cNvSpPr/>
+          <p:nvPr/>
+        </p:nvSpPr>
+        <p:spPr>
+          <a:xfrm>
+            <a:off x="3200400" y="822960"/>
+            <a:ext cx="2743200" cy="91440"/>
+          </a:xfrm>
+          <a:prstGeom prst="rect">
+            <a:avLst/>
+          </a:prstGeom>
+          <a:solidFill>
+            <a:srgbClr val="22C55E"/>
+          </a:solidFill>
+          <a:ln/>
+        </p:spPr>
+      </p:sp>
+      <p:sp>
+        <p:nvSpPr>
+          <p:cNvPr id="6" name="Shape 4"/>
+          <p:cNvSpPr/>
+          <p:nvPr/>
+        </p:nvSpPr>
+        <p:spPr>
+          <a:xfrm>
+            <a:off x="6400800" y="822960"/>
+            <a:ext cx="2743200" cy="91440"/>
+          </a:xfrm>
+          <a:prstGeom prst="rect">
+            <a:avLst/>
+          </a:prstGeom>
+          <a:solidFill>
+            <a:srgbClr val="3B82F6"/>
+          </a:solidFill>
+          <a:ln/>
+        </p:spPr>
+      </p:sp>
+      <p:sp>
+        <p:nvSpPr>
+          <p:cNvPr id="7" name="Shape 5"/>
+          <p:cNvSpPr/>
+          <p:nvPr/>
+        </p:nvSpPr>
+        <p:spPr>
+          <a:xfrm>
+            <a:off x="914400" y="1371600"/>
+            <a:ext cx="7315200" cy="1828800"/>
+          </a:xfrm>
+          <a:prstGeom prst="roundRect">
+            <a:avLst/>
+          </a:prstGeom>
+          <a:solidFill>
+            <a:srgbClr val="2A2A4A"/>
+          </a:solidFill>
+          <a:ln w="25400">
+            <a:solidFill>
+              <a:srgbClr val="667EEA"/>
+            </a:solidFill>
+            <a:prstDash val="solid"/>
+          </a:ln>
+        </p:spPr>
+      </p:sp>
+      <p:sp>
+        <p:nvSpPr>
+          <p:cNvPr id="8" name="Text 6"/>
+          <p:cNvSpPr/>
+          <p:nvPr/>
+        </p:nvSpPr>
+        <p:spPr>
+          <a:xfrm>
+            <a:off x="1097280" y="1371600"/>
+            <a:ext cx="457200" cy="731520"/>
+          </a:xfrm>
+          <a:prstGeom prst="rect">
+            <a:avLst/>
+          </a:prstGeom>
+          <a:noFill/>
+          <a:ln/>
+        </p:spPr>
+        <p:txBody>
+          <a:bodyPr wrap="square" rtlCol="0" anchor="ctr"/>
+          <a:lstStyle/>
+          <a:p>
+            <a:pPr indent="0" marL="0">
+              <a:buNone/>
+            </a:pPr>
+            <a:r>
+              <a:rPr lang="en-US" sz="4800" i="1" dirty="0">
+                <a:solidFill>
+                  <a:srgbClr val="667EEA"/>
+                </a:solidFill>
+                <a:latin typeface="Georgia" pitchFamily="34" charset="0"/>
+                <a:ea typeface="Georgia" pitchFamily="34" charset="-122"/>
+                <a:cs typeface="Georgia" pitchFamily="34" charset="-120"/>
+              </a:rPr>
+              <a:t>"</a:t>
+            </a:r>
+            <a:endParaRPr lang="en-US" sz="4800" dirty="0"/>
+          </a:p>
+        </p:txBody>
+      </p:sp>
+      <p:sp>
+        <p:nvSpPr>
+          <p:cNvPr id="9" name="Text 7"/>
+          <p:cNvSpPr/>
+          <p:nvPr/>
+        </p:nvSpPr>
+        <p:spPr>
+          <a:xfrm>
+            <a:off x="1371600" y="1737360"/>
+            <a:ext cx="6400800" cy="1097280"/>
+          </a:xfrm>
+          <a:prstGeom prst="rect">
+            <a:avLst/>
+          </a:prstGeom>
+          <a:noFill/>
+          <a:ln/>
+        </p:spPr>
+        <p:txBody>
+          <a:bodyPr wrap="square" rtlCol="0" anchor="ctr"/>
+          <a:lstStyle/>
+          <a:p>
+            <a:pPr algn="ctr" indent="0" marL="0">
+              <a:buNone/>
+            </a:pPr>
+            <a:r>
+              <a:rPr lang="en-US" sz="1600" i="1" dirty="0">
+                <a:solidFill>
+                  <a:srgbClr val="FFFFFF"/>
+                </a:solidFill>
+                <a:latin typeface="Arial" pitchFamily="34" charset="0"/>
+                <a:ea typeface="Arial" pitchFamily="34" charset="-122"/>
+                <a:cs typeface="Arial" pitchFamily="34" charset="-120"/>
+              </a:rPr>
+              <a:t>Não lute contra sua natureza - entenda-a e use-a. As premissas não são limitações, são o mapa para sua liberdade.</a:t>
+            </a:r>
+            <a:endParaRPr lang="en-US" sz="1600" dirty="0"/>
+          </a:p>
+        </p:txBody>
+      </p:sp>
+      <p:sp>
+        <p:nvSpPr>
+          <p:cNvPr id="10" name="Shape 8"/>
+          <p:cNvSpPr/>
+          <p:nvPr/>
+        </p:nvSpPr>
+        <p:spPr>
+          <a:xfrm>
+            <a:off x="0" y="3840480"/>
+            <a:ext cx="9144000" cy="822960"/>
+          </a:xfrm>
+          <a:prstGeom prst="rect">
+            <a:avLst/>
+          </a:prstGeom>
+          <a:solidFill>
+            <a:srgbClr val="0F172A"/>
+          </a:solidFill>
+          <a:ln/>
+        </p:spPr>
+      </p:sp>
+      <p:sp>
+        <p:nvSpPr>
+          <p:cNvPr id="11" name="Text 9"/>
+          <p:cNvSpPr/>
+          <p:nvPr/>
+        </p:nvSpPr>
+        <p:spPr>
+          <a:xfrm>
+            <a:off x="457200" y="3977640"/>
+            <a:ext cx="3657600" cy="274320"/>
+          </a:xfrm>
+          <a:prstGeom prst="rect">
+            <a:avLst/>
+          </a:prstGeom>
+          <a:noFill/>
+          <a:ln/>
+        </p:spPr>
+        <p:txBody>
+          <a:bodyPr wrap="square" rtlCol="0" anchor="ctr"/>
+          <a:lstStyle/>
+          <a:p>
+            <a:pPr indent="0" marL="0">
+              <a:buNone/>
+            </a:pPr>
+            <a:r>
+              <a:rPr lang="en-US" sz="1400" b="1" dirty="0">
+                <a:solidFill>
+                  <a:srgbClr val="22C55E"/>
+                </a:solidFill>
+                <a:latin typeface="Arial" pitchFamily="34" charset="0"/>
+                <a:ea typeface="Arial" pitchFamily="34" charset="-122"/>
+                <a:cs typeface="Arial" pitchFamily="34" charset="-120"/>
+              </a:rPr>
+              <a:t>Educa com Talento</a:t>
+            </a:r>
+            <a:endParaRPr lang="en-US" sz="1400" dirty="0"/>
+          </a:p>
+        </p:txBody>
+      </p:sp>
+      <p:sp>
+        <p:nvSpPr>
+          <p:cNvPr id="12" name="Text 10"/>
+          <p:cNvSpPr/>
+          <p:nvPr/>
+        </p:nvSpPr>
+        <p:spPr>
+          <a:xfrm>
+            <a:off x="457200" y="4251960"/>
+            <a:ext cx="3657600" cy="228600"/>
+          </a:xfrm>
+          <a:prstGeom prst="rect">
+            <a:avLst/>
+          </a:prstGeom>
+          <a:noFill/>
+          <a:ln/>
+        </p:spPr>
+        <p:txBody>
+          <a:bodyPr wrap="square" rtlCol="0" anchor="ctr"/>
+          <a:lstStyle/>
+          <a:p>
+            <a:pPr indent="0" marL="0">
+              <a:buNone/>
+            </a:pPr>
+            <a:r>
+              <a:rPr lang="en-US" sz="1000" dirty="0">
+                <a:solidFill>
+                  <a:srgbClr val="667EEA"/>
+                </a:solidFill>
+                <a:latin typeface="Arial" pitchFamily="34" charset="0"/>
+                <a:ea typeface="Arial" pitchFamily="34" charset="-122"/>
+                <a:cs typeface="Arial" pitchFamily="34" charset="-120"/>
+              </a:rPr>
+              <a:t>www.educacomtalento.com.br</a:t>
+            </a:r>
+            <a:endParaRPr lang="en-US" sz="1000" dirty="0"/>
+          </a:p>
+        </p:txBody>
+      </p:sp>
+      <p:pic>
+        <p:nvPicPr>
+          <p:cNvPr id="14" name="Image 0" descr="preencoded.png">    </p:cNvPr>
+          <p:cNvPicPr>
+            <a:picLocks noChangeAspect="1"/>
+          </p:cNvPicPr>
+          <p:nvPr/>
+        </p:nvPicPr>
+        <p:blipFill>
+          <a:blip r:embed="rId1"/>
+          <a:stretch>
+            <a:fillRect/>
+          </a:stretch>
+        </p:blipFill>
+        <p:spPr>
+          <a:xfrm>
+            <a:off x="6400800" y="3886200"/>
+            <a:ext cx="2286000" cy="914400"/>
           </a:xfrm>
           <a:prstGeom prst="rect">
             <a:avLst/>
@@ -2247,7 +2755,7 @@
                 <a:ea typeface="Arial" pitchFamily="34" charset="-122"/>
                 <a:cs typeface="Arial" pitchFamily="34" charset="-120"/>
               </a:rPr>
-              <a:t>Compreender as 4 premissas da atenção</a:t>
+              <a:t>Atenção limitada</a:t>
             </a:r>
             <a:endParaRPr lang="en-US" sz="1600" dirty="0"/>
           </a:p>
@@ -2370,7 +2878,7 @@
                 <a:ea typeface="Arial" pitchFamily="34" charset="-122"/>
                 <a:cs typeface="Arial" pitchFamily="34" charset="-120"/>
               </a:rPr>
-              <a:t>Aceitar limitações como vantagem</a:t>
+              <a:t>Foco intencional</a:t>
             </a:r>
             <a:endParaRPr lang="en-US" sz="1600" dirty="0"/>
           </a:p>
@@ -2493,7 +3001,7 @@
                 <a:ea typeface="Arial" pitchFamily="34" charset="-122"/>
                 <a:cs typeface="Arial" pitchFamily="34" charset="-120"/>
               </a:rPr>
-              <a:t>Aplicar as premissas no dia a dia</a:t>
+              <a:t>Ambiente é 80% do sucesso</a:t>
             </a:r>
             <a:endParaRPr lang="en-US" sz="1600" dirty="0"/>
           </a:p>
@@ -2521,7 +3029,7 @@
       </p:sp>
       <p:pic>
         <p:nvPicPr>
-          <p:cNvPr id="17" name="Image 0" descr="preencoded.png">    </p:cNvPr>
+          <p:cNvPr id="18" name="Image 0" descr="preencoded.png">    </p:cNvPr>
           <p:cNvPicPr>
             <a:picLocks noChangeAspect="1"/>
           </p:cNvPicPr>
@@ -2707,7 +3215,7 @@
                 <a:ea typeface="Arial" pitchFamily="34" charset="-122"/>
                 <a:cs typeface="Arial" pitchFamily="34" charset="-120"/>
               </a:rPr>
-              <a:t>Premissa 1: Atenção Limitada</a:t>
+              <a:t>Premissa 1: Sua atenção é limitada</a:t>
             </a:r>
             <a:endParaRPr lang="en-US" sz="2000" dirty="0"/>
           </a:p>
@@ -3099,37 +3607,7 @@
           <a:solidFill>
             <a:srgbClr val="667EEA"/>
           </a:solidFill>
-          <a:ln w="12700">
-            <a:solidFill>
-              <a:srgbClr val="000000"/>
-            </a:solidFill>
-            <a:prstDash val="solid"/>
-          </a:ln>
-        </p:spPr>
-      </p:sp>
-      <p:sp>
-        <p:nvSpPr>
-          <p:cNvPr id="20" name="Shape 18"/>
-          <p:cNvSpPr/>
-          <p:nvPr/>
-        </p:nvSpPr>
-        <p:spPr>
-          <a:xfrm>
-            <a:off x="8503920" y="4297680"/>
-            <a:ext cx="274320" cy="274320"/>
-          </a:xfrm>
-          <a:prstGeom prst="rect">
-            <a:avLst/>
-          </a:prstGeom>
-          <a:solidFill>
-            <a:srgbClr val="2A2A4A"/>
-          </a:solidFill>
-          <a:ln w="12700">
-            <a:solidFill>
-              <a:srgbClr val="667EEA"/>
-            </a:solidFill>
-            <a:prstDash val="solid"/>
-          </a:ln>
+          <a:ln/>
         </p:spPr>
       </p:sp>
       <p:pic>
@@ -3320,7 +3798,7 @@
                 <a:ea typeface="Arial" pitchFamily="34" charset="-122"/>
                 <a:cs typeface="Arial" pitchFamily="34" charset="-120"/>
               </a:rPr>
-              <a:t>Premissa 2: Foco Intencional</a:t>
+              <a:t>Premissa 2: O foco precisa ser intencional</a:t>
             </a:r>
             <a:endParaRPr lang="en-US" sz="2000" dirty="0"/>
           </a:p>
@@ -3443,7 +3921,7 @@
                 <a:ea typeface="Arial" pitchFamily="34" charset="-122"/>
                 <a:cs typeface="Arial" pitchFamily="34" charset="-120"/>
               </a:rPr>
-              <a:t>Cérebro busca novidade</a:t>
+              <a:t>O cérebro busca novidade por padrão</a:t>
             </a:r>
             <a:endParaRPr lang="en-US" sz="1400" dirty="0"/>
           </a:p>
@@ -3689,7 +4167,7 @@
                 <a:ea typeface="Arial" pitchFamily="34" charset="-122"/>
                 <a:cs typeface="Arial" pitchFamily="34" charset="-120"/>
               </a:rPr>
-              <a:t>Escolha consciente de focar</a:t>
+              <a:t>A escolha consciente de focar</a:t>
             </a:r>
             <a:endParaRPr lang="en-US" sz="1400" dirty="0"/>
           </a:p>
@@ -3712,37 +4190,7 @@
           <a:solidFill>
             <a:srgbClr val="22C55E"/>
           </a:solidFill>
-          <a:ln w="12700">
-            <a:solidFill>
-              <a:srgbClr val="000000"/>
-            </a:solidFill>
-            <a:prstDash val="solid"/>
-          </a:ln>
-        </p:spPr>
-      </p:sp>
-      <p:sp>
-        <p:nvSpPr>
-          <p:cNvPr id="20" name="Shape 18"/>
-          <p:cNvSpPr/>
-          <p:nvPr/>
-        </p:nvSpPr>
-        <p:spPr>
-          <a:xfrm>
-            <a:off x="8503920" y="4297680"/>
-            <a:ext cx="274320" cy="274320"/>
-          </a:xfrm>
-          <a:prstGeom prst="rect">
-            <a:avLst/>
-          </a:prstGeom>
-          <a:solidFill>
-            <a:srgbClr val="2A2A4A"/>
-          </a:solidFill>
-          <a:ln w="12700">
-            <a:solidFill>
-              <a:srgbClr val="22C55E"/>
-            </a:solidFill>
-            <a:prstDash val="solid"/>
-          </a:ln>
+          <a:ln/>
         </p:spPr>
       </p:sp>
       <p:pic>
@@ -3933,7 +4381,7 @@
                 <a:ea typeface="Arial" pitchFamily="34" charset="-122"/>
                 <a:cs typeface="Arial" pitchFamily="34" charset="-120"/>
               </a:rPr>
-              <a:t>Premissa 3: Ambiente Determina</a:t>
+              <a:t>Premissa 3: O ambiente determina seu foco</a:t>
             </a:r>
             <a:endParaRPr lang="en-US" sz="2000" dirty="0"/>
           </a:p>
@@ -4056,7 +4504,7 @@
                 <a:ea typeface="Arial" pitchFamily="34" charset="-122"/>
                 <a:cs typeface="Arial" pitchFamily="34" charset="-120"/>
               </a:rPr>
-              <a:t>Estímulos drenam atenção</a:t>
+              <a:t>Estímulos externos drenam atenção</a:t>
             </a:r>
             <a:endParaRPr lang="en-US" sz="1400" dirty="0"/>
           </a:p>
@@ -4179,7 +4627,7 @@
                 <a:ea typeface="Arial" pitchFamily="34" charset="-122"/>
                 <a:cs typeface="Arial" pitchFamily="34" charset="-120"/>
               </a:rPr>
-              <a:t>Design do ambiente ideal</a:t>
+              <a:t>Design do ambiente de estudo</a:t>
             </a:r>
             <a:endParaRPr lang="en-US" sz="1400" dirty="0"/>
           </a:p>
@@ -4302,7 +4750,7 @@
                 <a:ea typeface="Arial" pitchFamily="34" charset="-122"/>
                 <a:cs typeface="Arial" pitchFamily="34" charset="-120"/>
               </a:rPr>
-              <a:t>Redução de gatilhos</a:t>
+              <a:t>Redução de gatilhos de distração</a:t>
             </a:r>
             <a:endParaRPr lang="en-US" sz="1400" dirty="0"/>
           </a:p>
@@ -4325,37 +4773,7 @@
           <a:solidFill>
             <a:srgbClr val="3B82F6"/>
           </a:solidFill>
-          <a:ln w="12700">
-            <a:solidFill>
-              <a:srgbClr val="000000"/>
-            </a:solidFill>
-            <a:prstDash val="solid"/>
-          </a:ln>
-        </p:spPr>
-      </p:sp>
-      <p:sp>
-        <p:nvSpPr>
-          <p:cNvPr id="20" name="Shape 18"/>
-          <p:cNvSpPr/>
-          <p:nvPr/>
-        </p:nvSpPr>
-        <p:spPr>
-          <a:xfrm>
-            <a:off x="8503920" y="4297680"/>
-            <a:ext cx="274320" cy="274320"/>
-          </a:xfrm>
-          <a:prstGeom prst="rect">
-            <a:avLst/>
-          </a:prstGeom>
-          <a:solidFill>
-            <a:srgbClr val="2A2A4A"/>
-          </a:solidFill>
-          <a:ln w="12700">
-            <a:solidFill>
-              <a:srgbClr val="3B82F6"/>
-            </a:solidFill>
-            <a:prstDash val="solid"/>
-          </a:ln>
+          <a:ln/>
         </p:spPr>
       </p:sp>
       <p:pic>
@@ -4546,7 +4964,7 @@
                 <a:ea typeface="Arial" pitchFamily="34" charset="-122"/>
                 <a:cs typeface="Arial" pitchFamily="34" charset="-120"/>
               </a:rPr>
-              <a:t>Premissa 4: Mente Vagueia</a:t>
+              <a:t>Premissa 4: A mente vagueia naturalmente</a:t>
             </a:r>
             <a:endParaRPr lang="en-US" sz="2000" dirty="0"/>
           </a:p>
@@ -4792,7 +5210,7 @@
                 <a:ea typeface="Arial" pitchFamily="34" charset="-122"/>
                 <a:cs typeface="Arial" pitchFamily="34" charset="-120"/>
               </a:rPr>
-              <a:t>Use isso a seu favor</a:t>
+              <a:t>Como usar isso a seu favor</a:t>
             </a:r>
             <a:endParaRPr lang="en-US" sz="1400" dirty="0"/>
           </a:p>
@@ -4915,7 +5333,7 @@
                 <a:ea typeface="Arial" pitchFamily="34" charset="-122"/>
                 <a:cs typeface="Arial" pitchFamily="34" charset="-120"/>
               </a:rPr>
-              <a:t>Retorne sem culpa</a:t>
+              <a:t>Retornar ao foco sem culpa</a:t>
             </a:r>
             <a:endParaRPr lang="en-US" sz="1400" dirty="0"/>
           </a:p>
@@ -4938,37 +5356,7 @@
           <a:solidFill>
             <a:srgbClr val="9333EA"/>
           </a:solidFill>
-          <a:ln w="12700">
-            <a:solidFill>
-              <a:srgbClr val="000000"/>
-            </a:solidFill>
-            <a:prstDash val="solid"/>
-          </a:ln>
-        </p:spPr>
-      </p:sp>
-      <p:sp>
-        <p:nvSpPr>
-          <p:cNvPr id="20" name="Shape 18"/>
-          <p:cNvSpPr/>
-          <p:nvPr/>
-        </p:nvSpPr>
-        <p:spPr>
-          <a:xfrm>
-            <a:off x="8503920" y="4297680"/>
-            <a:ext cx="274320" cy="274320"/>
-          </a:xfrm>
-          <a:prstGeom prst="rect">
-            <a:avLst/>
-          </a:prstGeom>
-          <a:solidFill>
-            <a:srgbClr val="2A2A4A"/>
-          </a:solidFill>
-          <a:ln w="12700">
-            <a:solidFill>
-              <a:srgbClr val="9333EA"/>
-            </a:solidFill>
-            <a:prstDash val="solid"/>
-          </a:ln>
+          <a:ln/>
         </p:spPr>
       </p:sp>
       <p:pic>
@@ -5366,7 +5754,7 @@
                 <a:ea typeface="Arial" pitchFamily="34" charset="-122"/>
                 <a:cs typeface="Arial" pitchFamily="34" charset="-120"/>
               </a:rPr>
-              <a:t>Foco intencional = escolha consciente repetida</a:t>
+              <a:t>Foco intencional = escolha consciente, repetida</a:t>
             </a:r>
             <a:endParaRPr lang="en-US" sz="1400" dirty="0"/>
           </a:p>
@@ -5489,7 +5877,7 @@
                 <a:ea typeface="Arial" pitchFamily="34" charset="-122"/>
                 <a:cs typeface="Arial" pitchFamily="34" charset="-120"/>
               </a:rPr>
-              <a:t>Ambiente é 80% do sucesso no foco</a:t>
+              <a:t>Ambiente é 80% do sucesso = desenhe a seu favor</a:t>
             </a:r>
             <a:endParaRPr lang="en-US" sz="1400" dirty="0"/>
           </a:p>
@@ -5612,7 +6000,7 @@
                 <a:ea typeface="Arial" pitchFamily="34" charset="-122"/>
                 <a:cs typeface="Arial" pitchFamily="34" charset="-120"/>
               </a:rPr>
-              <a:t>Vagueamento é normal - redirecione sem culpa</a:t>
+              <a:t>Vagueamento é normal = redirecione sem culpa</a:t>
             </a:r>
             <a:endParaRPr lang="en-US" sz="1400" dirty="0"/>
           </a:p>
@@ -5620,7 +6008,7 @@
       </p:sp>
       <p:pic>
         <p:nvPicPr>
-          <p:cNvPr id="22" name="Image 0" descr="preencoded.png">    </p:cNvPr>
+          <p:cNvPr id="23" name="Image 0" descr="preencoded.png">    </p:cNvPr>
           <p:cNvPicPr>
             <a:picLocks noChangeAspect="1"/>
           </p:cNvPicPr>
@@ -5727,67 +6115,46 @@
                 <a:ea typeface="Arial" pitchFamily="34" charset="-122"/>
                 <a:cs typeface="Arial" pitchFamily="34" charset="-120"/>
               </a:rPr>
-              <a:t>📝 Atividade Prática</a:t>
+              <a:t>📊 Infográfico da Aula</a:t>
             </a:r>
             <a:endParaRPr lang="en-US" sz="2000" dirty="0"/>
           </a:p>
         </p:txBody>
       </p:sp>
-      <p:sp>
-        <p:nvSpPr>
-          <p:cNvPr id="4" name="Shape 2"/>
-          <p:cNvSpPr/>
-          <p:nvPr/>
-        </p:nvSpPr>
-        <p:spPr>
-          <a:xfrm>
-            <a:off x="457200" y="1005840"/>
-            <a:ext cx="8229600" cy="2560320"/>
-          </a:xfrm>
-          <a:prstGeom prst="roundRect">
-            <a:avLst/>
-          </a:prstGeom>
-          <a:solidFill>
-            <a:srgbClr val="2A2A4A"/>
-          </a:solidFill>
-          <a:ln w="38100">
-            <a:solidFill>
-              <a:srgbClr val="22C55E"/>
-            </a:solidFill>
-            <a:prstDash val="solid"/>
-          </a:ln>
-        </p:spPr>
-      </p:sp>
-      <p:sp>
-        <p:nvSpPr>
-          <p:cNvPr id="5" name="Shape 3"/>
-          <p:cNvSpPr/>
-          <p:nvPr/>
-        </p:nvSpPr>
-        <p:spPr>
-          <a:xfrm>
-            <a:off x="731520" y="1280160"/>
-            <a:ext cx="731520" cy="731520"/>
-          </a:xfrm>
-          <a:prstGeom prst="ellipse">
-            <a:avLst/>
-          </a:prstGeom>
-          <a:solidFill>
-            <a:srgbClr val="22C55E"/>
-          </a:solidFill>
-          <a:ln/>
-        </p:spPr>
-      </p:sp>
-      <p:sp>
-        <p:nvSpPr>
-          <p:cNvPr id="6" name="Text 4"/>
-          <p:cNvSpPr/>
-          <p:nvPr/>
-        </p:nvSpPr>
-        <p:spPr>
-          <a:xfrm>
-            <a:off x="731520" y="1371600"/>
-            <a:ext cx="731520" cy="548640"/>
+      <p:pic>
+        <p:nvPicPr>
+          <p:cNvPr id="4" name="Image 0" descr="preencoded.png">    </p:cNvPr>
+          <p:cNvPicPr>
+            <a:picLocks noChangeAspect="1"/>
+          </p:cNvPicPr>
+          <p:nvPr/>
+        </p:nvPicPr>
+        <p:blipFill>
+          <a:blip r:embed="rId1"/>
+          <a:stretch>
+            <a:fillRect/>
+          </a:stretch>
+        </p:blipFill>
+        <p:spPr>
+          <a:xfrm>
+            <a:off x="274320" y="914400"/>
+            <a:ext cx="5486400" cy="3383280"/>
+          </a:xfrm>
+          <a:prstGeom prst="rect">
+            <a:avLst/>
+          </a:prstGeom>
+        </p:spPr>
+      </p:pic>
+      <p:sp>
+        <p:nvSpPr>
+          <p:cNvPr id="5" name="Text 2"/>
+          <p:cNvSpPr/>
+          <p:nvPr/>
+        </p:nvSpPr>
+        <p:spPr>
+          <a:xfrm>
+            <a:off x="5943600" y="914400"/>
+            <a:ext cx="3017520" cy="365760"/>
           </a:xfrm>
           <a:prstGeom prst="rect">
             <a:avLst/>
@@ -5799,11 +6166,70 @@
           <a:bodyPr wrap="square" rtlCol="0" anchor="ctr"/>
           <a:lstStyle/>
           <a:p>
-            <a:pPr algn="ctr" indent="0" marL="0">
+            <a:pPr indent="0" marL="0">
               <a:buNone/>
             </a:pPr>
             <a:r>
-              <a:rPr lang="en-US" sz="2800" b="1" dirty="0">
+              <a:rPr lang="en-US" sz="1200" b="1" dirty="0">
+                <a:solidFill>
+                  <a:srgbClr val="22C55E"/>
+                </a:solidFill>
+                <a:latin typeface="Arial" pitchFamily="34" charset="0"/>
+                <a:ea typeface="Arial" pitchFamily="34" charset="-122"/>
+                <a:cs typeface="Arial" pitchFamily="34" charset="-120"/>
+              </a:rPr>
+              <a:t>Conceitos Principais:</a:t>
+            </a:r>
+            <a:endParaRPr lang="en-US" sz="1200" dirty="0"/>
+          </a:p>
+        </p:txBody>
+      </p:sp>
+      <p:sp>
+        <p:nvSpPr>
+          <p:cNvPr id="6" name="Shape 3"/>
+          <p:cNvSpPr/>
+          <p:nvPr/>
+        </p:nvSpPr>
+        <p:spPr>
+          <a:xfrm>
+            <a:off x="5943600" y="1371600"/>
+            <a:ext cx="228600" cy="228600"/>
+          </a:xfrm>
+          <a:prstGeom prst="ellipse">
+            <a:avLst/>
+          </a:prstGeom>
+          <a:solidFill>
+            <a:srgbClr val="667EEA"/>
+          </a:solidFill>
+          <a:ln/>
+        </p:spPr>
+      </p:sp>
+      <p:sp>
+        <p:nvSpPr>
+          <p:cNvPr id="7" name="Text 4"/>
+          <p:cNvSpPr/>
+          <p:nvPr/>
+        </p:nvSpPr>
+        <p:spPr>
+          <a:xfrm>
+            <a:off x="6309360" y="1325880"/>
+            <a:ext cx="2560320" cy="731520"/>
+          </a:xfrm>
+          <a:prstGeom prst="rect">
+            <a:avLst/>
+          </a:prstGeom>
+          <a:noFill/>
+          <a:ln/>
+        </p:spPr>
+        <p:txBody>
+          <a:bodyPr wrap="square" rtlCol="0" anchor="t"/>
+          <a:lstStyle/>
+          <a:p>
+            <a:pPr indent="0" marL="0">
+              <a:buNone/>
+            </a:pPr>
+            <a:r>
+              <a:rPr lang="en-US" sz="1000" dirty="0">
                 <a:solidFill>
                   <a:srgbClr val="FFFFFF"/>
                 </a:solidFill>
@@ -5811,77 +6237,58 @@
                 <a:ea typeface="Arial" pitchFamily="34" charset="-122"/>
                 <a:cs typeface="Arial" pitchFamily="34" charset="-120"/>
               </a:rPr>
-              <a:t>!</a:t>
-            </a:r>
-            <a:endParaRPr lang="en-US" sz="2800" dirty="0"/>
-          </a:p>
-        </p:txBody>
-      </p:sp>
-      <p:sp>
-        <p:nvSpPr>
-          <p:cNvPr id="7" name="Text 5"/>
-          <p:cNvSpPr/>
-          <p:nvPr/>
-        </p:nvSpPr>
-        <p:spPr>
-          <a:xfrm>
-            <a:off x="1645920" y="1280160"/>
-            <a:ext cx="6858000" cy="457200"/>
-          </a:xfrm>
-          <a:prstGeom prst="rect">
-            <a:avLst/>
-          </a:prstGeom>
-          <a:noFill/>
-          <a:ln/>
-        </p:spPr>
-        <p:txBody>
-          <a:bodyPr wrap="square" rtlCol="0" anchor="ctr"/>
+              <a:t>Atenção limitada = recurso precioso, não desperdice</a:t>
+            </a:r>
+            <a:endParaRPr lang="en-US" sz="1000" dirty="0"/>
+          </a:p>
+        </p:txBody>
+      </p:sp>
+      <p:sp>
+        <p:nvSpPr>
+          <p:cNvPr id="8" name="Shape 5"/>
+          <p:cNvSpPr/>
+          <p:nvPr/>
+        </p:nvSpPr>
+        <p:spPr>
+          <a:xfrm>
+            <a:off x="5943600" y="2148840"/>
+            <a:ext cx="228600" cy="228600"/>
+          </a:xfrm>
+          <a:prstGeom prst="ellipse">
+            <a:avLst/>
+          </a:prstGeom>
+          <a:solidFill>
+            <a:srgbClr val="667EEA"/>
+          </a:solidFill>
+          <a:ln/>
+        </p:spPr>
+      </p:sp>
+      <p:sp>
+        <p:nvSpPr>
+          <p:cNvPr id="9" name="Text 6"/>
+          <p:cNvSpPr/>
+          <p:nvPr/>
+        </p:nvSpPr>
+        <p:spPr>
+          <a:xfrm>
+            <a:off x="6309360" y="2103120"/>
+            <a:ext cx="2560320" cy="731520"/>
+          </a:xfrm>
+          <a:prstGeom prst="rect">
+            <a:avLst/>
+          </a:prstGeom>
+          <a:noFill/>
+          <a:ln/>
+        </p:spPr>
+        <p:txBody>
+          <a:bodyPr wrap="square" rtlCol="0" anchor="t"/>
           <a:lstStyle/>
           <a:p>
             <a:pPr indent="0" marL="0">
               <a:buNone/>
             </a:pPr>
             <a:r>
-              <a:rPr lang="en-US" sz="1600" b="1" dirty="0">
-                <a:solidFill>
-                  <a:srgbClr val="22C55E"/>
-                </a:solidFill>
-                <a:latin typeface="Arial" pitchFamily="34" charset="0"/>
-                <a:ea typeface="Arial" pitchFamily="34" charset="-122"/>
-                <a:cs typeface="Arial" pitchFamily="34" charset="-120"/>
-              </a:rPr>
-              <a:t>Sua Missão:</a:t>
-            </a:r>
-            <a:endParaRPr lang="en-US" sz="1600" dirty="0"/>
-          </a:p>
-        </p:txBody>
-      </p:sp>
-      <p:sp>
-        <p:nvSpPr>
-          <p:cNvPr id="8" name="Text 6"/>
-          <p:cNvSpPr/>
-          <p:nvPr/>
-        </p:nvSpPr>
-        <p:spPr>
-          <a:xfrm>
-            <a:off x="1645920" y="1737360"/>
-            <a:ext cx="6766560" cy="1645920"/>
-          </a:xfrm>
-          <a:prstGeom prst="rect">
-            <a:avLst/>
-          </a:prstGeom>
-          <a:noFill/>
-          <a:ln/>
-        </p:spPr>
-        <p:txBody>
-          <a:bodyPr wrap="square" rtlCol="0" anchor="t"/>
-          <a:lstStyle/>
-          <a:p>
-            <a:pPr indent="0" marL="0">
-              <a:buNone/>
-            </a:pPr>
-            <a:r>
-              <a:rPr lang="en-US" sz="1400" dirty="0">
+              <a:rPr lang="en-US" sz="1000" dirty="0">
                 <a:solidFill>
                   <a:srgbClr val="FFFFFF"/>
                 </a:solidFill>
@@ -5889,22 +6296,58 @@
                 <a:ea typeface="Arial" pitchFamily="34" charset="-122"/>
                 <a:cs typeface="Arial" pitchFamily="34" charset="-120"/>
               </a:rPr>
-              <a:t>Auditoria do Ambiente de Estudo:</a:t>
-            </a:r>
-            <a:endParaRPr lang="en-US" sz="1400" dirty="0"/>
-          </a:p>
+              <a:t>Foco intencional = escolha consciente, repetida</a:t>
+            </a:r>
+            <a:endParaRPr lang="en-US" sz="1000" dirty="0"/>
+          </a:p>
+        </p:txBody>
+      </p:sp>
+      <p:sp>
+        <p:nvSpPr>
+          <p:cNvPr id="10" name="Shape 7"/>
+          <p:cNvSpPr/>
+          <p:nvPr/>
+        </p:nvSpPr>
+        <p:spPr>
+          <a:xfrm>
+            <a:off x="5943600" y="2926080"/>
+            <a:ext cx="228600" cy="228600"/>
+          </a:xfrm>
+          <a:prstGeom prst="ellipse">
+            <a:avLst/>
+          </a:prstGeom>
+          <a:solidFill>
+            <a:srgbClr val="667EEA"/>
+          </a:solidFill>
+          <a:ln/>
+        </p:spPr>
+      </p:sp>
+      <p:sp>
+        <p:nvSpPr>
+          <p:cNvPr id="11" name="Text 8"/>
+          <p:cNvSpPr/>
+          <p:nvPr/>
+        </p:nvSpPr>
+        <p:spPr>
+          <a:xfrm>
+            <a:off x="6309360" y="2880360"/>
+            <a:ext cx="2560320" cy="731520"/>
+          </a:xfrm>
+          <a:prstGeom prst="rect">
+            <a:avLst/>
+          </a:prstGeom>
+          <a:noFill/>
+          <a:ln/>
+        </p:spPr>
+        <p:txBody>
+          <a:bodyPr wrap="square" rtlCol="0" anchor="t"/>
+          <a:lstStyle/>
           <a:p>
             <a:pPr indent="0" marL="0">
               <a:buNone/>
             </a:pPr>
-            <a:endParaRPr lang="en-US" sz="1400" dirty="0"/>
-          </a:p>
-          <a:p>
-            <a:pPr indent="0" marL="0">
-              <a:buNone/>
-            </a:pPr>
-            <a:r>
-              <a:rPr lang="en-US" sz="1400" dirty="0">
+            <a:r>
+              <a:rPr lang="en-US" sz="1000" dirty="0">
                 <a:solidFill>
                   <a:srgbClr val="FFFFFF"/>
                 </a:solidFill>
@@ -5912,16 +6355,58 @@
                 <a:ea typeface="Arial" pitchFamily="34" charset="-122"/>
                 <a:cs typeface="Arial" pitchFamily="34" charset="-120"/>
               </a:rPr>
-              <a:t>1. Tire foto ANTES do seu ambiente atual</a:t>
-            </a:r>
-            <a:endParaRPr lang="en-US" sz="1400" dirty="0"/>
-          </a:p>
+              <a:t>Ambiente é 80% do sucesso = desenhe a seu favor</a:t>
+            </a:r>
+            <a:endParaRPr lang="en-US" sz="1000" dirty="0"/>
+          </a:p>
+        </p:txBody>
+      </p:sp>
+      <p:sp>
+        <p:nvSpPr>
+          <p:cNvPr id="12" name="Shape 9"/>
+          <p:cNvSpPr/>
+          <p:nvPr/>
+        </p:nvSpPr>
+        <p:spPr>
+          <a:xfrm>
+            <a:off x="5943600" y="3703320"/>
+            <a:ext cx="228600" cy="228600"/>
+          </a:xfrm>
+          <a:prstGeom prst="ellipse">
+            <a:avLst/>
+          </a:prstGeom>
+          <a:solidFill>
+            <a:srgbClr val="667EEA"/>
+          </a:solidFill>
+          <a:ln/>
+        </p:spPr>
+      </p:sp>
+      <p:sp>
+        <p:nvSpPr>
+          <p:cNvPr id="13" name="Text 10"/>
+          <p:cNvSpPr/>
+          <p:nvPr/>
+        </p:nvSpPr>
+        <p:spPr>
+          <a:xfrm>
+            <a:off x="6309360" y="3657600"/>
+            <a:ext cx="2560320" cy="731520"/>
+          </a:xfrm>
+          <a:prstGeom prst="rect">
+            <a:avLst/>
+          </a:prstGeom>
+          <a:noFill/>
+          <a:ln/>
+        </p:spPr>
+        <p:txBody>
+          <a:bodyPr wrap="square" rtlCol="0" anchor="t"/>
+          <a:lstStyle/>
           <a:p>
             <a:pPr indent="0" marL="0">
               <a:buNone/>
             </a:pPr>
             <a:r>
-              <a:rPr lang="en-US" sz="1400" dirty="0">
+              <a:rPr lang="en-US" sz="1000" dirty="0">
                 <a:solidFill>
                   <a:srgbClr val="FFFFFF"/>
                 </a:solidFill>
@@ -5929,137 +6414,22 @@
                 <a:ea typeface="Arial" pitchFamily="34" charset="-122"/>
                 <a:cs typeface="Arial" pitchFamily="34" charset="-120"/>
               </a:rPr>
-              <a:t>2. Liste todos os "sequestradores de atenção"</a:t>
-            </a:r>
-            <a:endParaRPr lang="en-US" sz="1400" dirty="0"/>
-          </a:p>
-          <a:p>
-            <a:pPr indent="0" marL="0">
-              <a:buNone/>
-            </a:pPr>
-            <a:r>
-              <a:rPr lang="en-US" sz="1400" dirty="0">
-                <a:solidFill>
-                  <a:srgbClr val="FFFFFF"/>
-                </a:solidFill>
-                <a:latin typeface="Arial" pitchFamily="34" charset="0"/>
-                <a:ea typeface="Arial" pitchFamily="34" charset="-122"/>
-                <a:cs typeface="Arial" pitchFamily="34" charset="-120"/>
-              </a:rPr>
-              <a:t>3. Faça as mudanças necessárias</a:t>
-            </a:r>
-            <a:endParaRPr lang="en-US" sz="1400" dirty="0"/>
-          </a:p>
-          <a:p>
-            <a:pPr indent="0" marL="0">
-              <a:buNone/>
-            </a:pPr>
-            <a:r>
-              <a:rPr lang="en-US" sz="1400" dirty="0">
-                <a:solidFill>
-                  <a:srgbClr val="FFFFFF"/>
-                </a:solidFill>
-                <a:latin typeface="Arial" pitchFamily="34" charset="0"/>
-                <a:ea typeface="Arial" pitchFamily="34" charset="-122"/>
-                <a:cs typeface="Arial" pitchFamily="34" charset="-120"/>
-              </a:rPr>
-              <a:t>4. Tire foto DEPOIS</a:t>
-            </a:r>
-            <a:endParaRPr lang="en-US" sz="1400" dirty="0"/>
-          </a:p>
-          <a:p>
-            <a:pPr indent="0" marL="0">
-              <a:buNone/>
-            </a:pPr>
-            <a:r>
-              <a:rPr lang="en-US" sz="1400" dirty="0">
-                <a:solidFill>
-                  <a:srgbClr val="FFFFFF"/>
-                </a:solidFill>
-                <a:latin typeface="Arial" pitchFamily="34" charset="0"/>
-                <a:ea typeface="Arial" pitchFamily="34" charset="-122"/>
-                <a:cs typeface="Arial" pitchFamily="34" charset="-120"/>
-              </a:rPr>
-              <a:t>5. Compare e reflita sobre as mudanças</a:t>
-            </a:r>
-            <a:endParaRPr lang="en-US" sz="1400" dirty="0"/>
-          </a:p>
-        </p:txBody>
-      </p:sp>
-      <p:sp>
-        <p:nvSpPr>
-          <p:cNvPr id="9" name="Shape 7"/>
-          <p:cNvSpPr/>
-          <p:nvPr/>
-        </p:nvSpPr>
-        <p:spPr>
-          <a:xfrm>
-            <a:off x="457200" y="3749040"/>
-            <a:ext cx="8229600" cy="640080"/>
-          </a:xfrm>
-          <a:prstGeom prst="roundRect">
-            <a:avLst/>
-          </a:prstGeom>
-          <a:solidFill>
-            <a:srgbClr val="1E3A5F"/>
-          </a:solidFill>
-          <a:ln w="12700">
-            <a:solidFill>
-              <a:srgbClr val="667EEA"/>
-            </a:solidFill>
-            <a:prstDash val="solid"/>
-          </a:ln>
-        </p:spPr>
-      </p:sp>
-      <p:sp>
-        <p:nvSpPr>
-          <p:cNvPr id="10" name="Text 8"/>
-          <p:cNvSpPr/>
-          <p:nvPr/>
-        </p:nvSpPr>
-        <p:spPr>
-          <a:xfrm>
-            <a:off x="457200" y="3886200"/>
-            <a:ext cx="8229600" cy="365760"/>
-          </a:xfrm>
-          <a:prstGeom prst="rect">
-            <a:avLst/>
-          </a:prstGeom>
-          <a:noFill/>
-          <a:ln/>
-        </p:spPr>
-        <p:txBody>
-          <a:bodyPr wrap="square" rtlCol="0" anchor="ctr"/>
-          <a:lstStyle/>
-          <a:p>
-            <a:pPr algn="ctr" indent="0" marL="0">
-              <a:buNone/>
-            </a:pPr>
-            <a:r>
-              <a:rPr lang="en-US" sz="1300" dirty="0">
-                <a:solidFill>
-                  <a:srgbClr val="FFFFFF"/>
-                </a:solidFill>
-                <a:latin typeface="Arial" pitchFamily="34" charset="0"/>
-                <a:ea typeface="Arial" pitchFamily="34" charset="-122"/>
-                <a:cs typeface="Arial" pitchFamily="34" charset="-120"/>
-              </a:rPr>
-              <a:t>📤 Envie na área de atividades do Moodle</a:t>
-            </a:r>
-            <a:endParaRPr lang="en-US" sz="1300" dirty="0"/>
+              <a:t>Vagueamento é normal = redirecione sem culpa</a:t>
+            </a:r>
+            <a:endParaRPr lang="en-US" sz="1000" dirty="0"/>
           </a:p>
         </p:txBody>
       </p:sp>
       <p:pic>
         <p:nvPicPr>
-          <p:cNvPr id="11" name="Image 0" descr="preencoded.png">    </p:cNvPr>
+          <p:cNvPr id="15" name="Image 1" descr="preencoded.png">    </p:cNvPr>
           <p:cNvPicPr>
             <a:picLocks noChangeAspect="1"/>
           </p:cNvPicPr>
           <p:nvPr/>
         </p:nvPicPr>
         <p:blipFill>
-          <a:blip r:embed="rId1"/>
+          <a:blip r:embed="rId2"/>
           <a:stretch>
             <a:fillRect/>
           </a:stretch>
@@ -6159,7 +6529,7 @@
                 <a:ea typeface="Arial" pitchFamily="34" charset="-122"/>
                 <a:cs typeface="Arial" pitchFamily="34" charset="-120"/>
               </a:rPr>
-              <a:t>Aula 03 - Encerramento</a:t>
+              <a:t>📝 Atividade Prática</a:t>
             </a:r>
             <a:endParaRPr lang="en-US" sz="2000" dirty="0"/>
           </a:p>
@@ -6173,68 +6543,8 @@
         </p:nvSpPr>
         <p:spPr>
           <a:xfrm>
-            <a:off x="0" y="822960"/>
-            <a:ext cx="2743200" cy="91440"/>
-          </a:xfrm>
-          <a:prstGeom prst="rect">
-            <a:avLst/>
-          </a:prstGeom>
-          <a:solidFill>
-            <a:srgbClr val="667EEA"/>
-          </a:solidFill>
-          <a:ln/>
-        </p:spPr>
-      </p:sp>
-      <p:sp>
-        <p:nvSpPr>
-          <p:cNvPr id="5" name="Shape 3"/>
-          <p:cNvSpPr/>
-          <p:nvPr/>
-        </p:nvSpPr>
-        <p:spPr>
-          <a:xfrm>
-            <a:off x="3200400" y="822960"/>
-            <a:ext cx="2743200" cy="91440"/>
-          </a:xfrm>
-          <a:prstGeom prst="rect">
-            <a:avLst/>
-          </a:prstGeom>
-          <a:solidFill>
-            <a:srgbClr val="22C55E"/>
-          </a:solidFill>
-          <a:ln/>
-        </p:spPr>
-      </p:sp>
-      <p:sp>
-        <p:nvSpPr>
-          <p:cNvPr id="6" name="Shape 4"/>
-          <p:cNvSpPr/>
-          <p:nvPr/>
-        </p:nvSpPr>
-        <p:spPr>
-          <a:xfrm>
-            <a:off x="6400800" y="822960"/>
-            <a:ext cx="2743200" cy="91440"/>
-          </a:xfrm>
-          <a:prstGeom prst="rect">
-            <a:avLst/>
-          </a:prstGeom>
-          <a:solidFill>
-            <a:srgbClr val="3B82F6"/>
-          </a:solidFill>
-          <a:ln/>
-        </p:spPr>
-      </p:sp>
-      <p:sp>
-        <p:nvSpPr>
-          <p:cNvPr id="7" name="Shape 5"/>
-          <p:cNvSpPr/>
-          <p:nvPr/>
-        </p:nvSpPr>
-        <p:spPr>
-          <a:xfrm>
-            <a:off x="914400" y="1371600"/>
-            <a:ext cx="7315200" cy="1828800"/>
+            <a:off x="457200" y="1005840"/>
+            <a:ext cx="8229600" cy="2560320"/>
           </a:xfrm>
           <a:prstGeom prst="roundRect">
             <a:avLst/>
@@ -6242,9 +6552,9 @@
           <a:solidFill>
             <a:srgbClr val="2A2A4A"/>
           </a:solidFill>
-          <a:ln w="25400">
+          <a:ln w="38100">
             <a:solidFill>
-              <a:srgbClr val="667EEA"/>
+              <a:srgbClr val="22C55E"/>
             </a:solidFill>
             <a:prstDash val="solid"/>
           </a:ln>
@@ -6252,53 +6562,34 @@
       </p:sp>
       <p:sp>
         <p:nvSpPr>
-          <p:cNvPr id="8" name="Text 6"/>
-          <p:cNvSpPr/>
-          <p:nvPr/>
-        </p:nvSpPr>
-        <p:spPr>
-          <a:xfrm>
-            <a:off x="1097280" y="1371600"/>
-            <a:ext cx="457200" cy="731520"/>
-          </a:xfrm>
-          <a:prstGeom prst="rect">
-            <a:avLst/>
-          </a:prstGeom>
-          <a:noFill/>
-          <a:ln/>
-        </p:spPr>
-        <p:txBody>
-          <a:bodyPr wrap="square" rtlCol="0" anchor="ctr"/>
-          <a:lstStyle/>
-          <a:p>
-            <a:pPr indent="0" marL="0">
-              <a:buNone/>
-            </a:pPr>
-            <a:r>
-              <a:rPr lang="en-US" sz="4800" i="1" dirty="0">
-                <a:solidFill>
-                  <a:srgbClr val="667EEA"/>
-                </a:solidFill>
-                <a:latin typeface="Georgia" pitchFamily="34" charset="0"/>
-                <a:ea typeface="Georgia" pitchFamily="34" charset="-122"/>
-                <a:cs typeface="Georgia" pitchFamily="34" charset="-120"/>
-              </a:rPr>
-              <a:t>"</a:t>
-            </a:r>
-            <a:endParaRPr lang="en-US" sz="4800" dirty="0"/>
-          </a:p>
-        </p:txBody>
-      </p:sp>
-      <p:sp>
-        <p:nvSpPr>
-          <p:cNvPr id="9" name="Text 7"/>
-          <p:cNvSpPr/>
-          <p:nvPr/>
-        </p:nvSpPr>
-        <p:spPr>
-          <a:xfrm>
-            <a:off x="1371600" y="1737360"/>
-            <a:ext cx="6400800" cy="1097280"/>
+          <p:cNvPr id="5" name="Shape 3"/>
+          <p:cNvSpPr/>
+          <p:nvPr/>
+        </p:nvSpPr>
+        <p:spPr>
+          <a:xfrm>
+            <a:off x="731520" y="1280160"/>
+            <a:ext cx="731520" cy="731520"/>
+          </a:xfrm>
+          <a:prstGeom prst="ellipse">
+            <a:avLst/>
+          </a:prstGeom>
+          <a:solidFill>
+            <a:srgbClr val="22C55E"/>
+          </a:solidFill>
+          <a:ln/>
+        </p:spPr>
+      </p:sp>
+      <p:sp>
+        <p:nvSpPr>
+          <p:cNvPr id="6" name="Text 4"/>
+          <p:cNvSpPr/>
+          <p:nvPr/>
+        </p:nvSpPr>
+        <p:spPr>
+          <a:xfrm>
+            <a:off x="731520" y="1371600"/>
+            <a:ext cx="731520" cy="548640"/>
           </a:xfrm>
           <a:prstGeom prst="rect">
             <a:avLst/>
@@ -6314,7 +6605,7 @@
               <a:buNone/>
             </a:pPr>
             <a:r>
-              <a:rPr lang="en-US" sz="1600" i="1" dirty="0">
+              <a:rPr lang="en-US" sz="2800" b="1" dirty="0">
                 <a:solidFill>
                   <a:srgbClr val="FFFFFF"/>
                 </a:solidFill>
@@ -6322,42 +6613,22 @@
                 <a:ea typeface="Arial" pitchFamily="34" charset="-122"/>
                 <a:cs typeface="Arial" pitchFamily="34" charset="-120"/>
               </a:rPr>
-              <a:t>Não lute contra sua natureza - entenda-a e use-a. As premissas são o mapa para sua liberdade.</a:t>
-            </a:r>
-            <a:endParaRPr lang="en-US" sz="1600" dirty="0"/>
-          </a:p>
-        </p:txBody>
-      </p:sp>
-      <p:sp>
-        <p:nvSpPr>
-          <p:cNvPr id="10" name="Shape 8"/>
-          <p:cNvSpPr/>
-          <p:nvPr/>
-        </p:nvSpPr>
-        <p:spPr>
-          <a:xfrm>
-            <a:off x="0" y="3840480"/>
-            <a:ext cx="9144000" cy="822960"/>
-          </a:xfrm>
-          <a:prstGeom prst="rect">
-            <a:avLst/>
-          </a:prstGeom>
-          <a:solidFill>
-            <a:srgbClr val="0F172A"/>
-          </a:solidFill>
-          <a:ln/>
-        </p:spPr>
-      </p:sp>
-      <p:sp>
-        <p:nvSpPr>
-          <p:cNvPr id="11" name="Text 9"/>
-          <p:cNvSpPr/>
-          <p:nvPr/>
-        </p:nvSpPr>
-        <p:spPr>
-          <a:xfrm>
-            <a:off x="457200" y="3977640"/>
-            <a:ext cx="3657600" cy="274320"/>
+              <a:t>!</a:t>
+            </a:r>
+            <a:endParaRPr lang="en-US" sz="2800" dirty="0"/>
+          </a:p>
+        </p:txBody>
+      </p:sp>
+      <p:sp>
+        <p:nvSpPr>
+          <p:cNvPr id="7" name="Text 5"/>
+          <p:cNvSpPr/>
+          <p:nvPr/>
+        </p:nvSpPr>
+        <p:spPr>
+          <a:xfrm>
+            <a:off x="1645920" y="1280160"/>
+            <a:ext cx="6858000" cy="457200"/>
           </a:xfrm>
           <a:prstGeom prst="rect">
             <a:avLst/>
@@ -6373,7 +6644,7 @@
               <a:buNone/>
             </a:pPr>
             <a:r>
-              <a:rPr lang="en-US" sz="1400" b="1" dirty="0">
+              <a:rPr lang="en-US" sz="1600" b="1" dirty="0">
                 <a:solidFill>
                   <a:srgbClr val="22C55E"/>
                 </a:solidFill>
@@ -6381,54 +6652,118 @@
                 <a:ea typeface="Arial" pitchFamily="34" charset="-122"/>
                 <a:cs typeface="Arial" pitchFamily="34" charset="-120"/>
               </a:rPr>
-              <a:t>Educa com Talento</a:t>
-            </a:r>
-            <a:endParaRPr lang="en-US" sz="1400" dirty="0"/>
-          </a:p>
-        </p:txBody>
-      </p:sp>
-      <p:sp>
-        <p:nvSpPr>
-          <p:cNvPr id="12" name="Text 10"/>
-          <p:cNvSpPr/>
-          <p:nvPr/>
-        </p:nvSpPr>
-        <p:spPr>
-          <a:xfrm>
-            <a:off x="457200" y="4251960"/>
-            <a:ext cx="3657600" cy="228600"/>
-          </a:xfrm>
-          <a:prstGeom prst="rect">
-            <a:avLst/>
-          </a:prstGeom>
-          <a:noFill/>
-          <a:ln/>
-        </p:spPr>
-        <p:txBody>
-          <a:bodyPr wrap="square" rtlCol="0" anchor="ctr"/>
+              <a:t>Sua Missão:</a:t>
+            </a:r>
+            <a:endParaRPr lang="en-US" sz="1600" dirty="0"/>
+          </a:p>
+        </p:txBody>
+      </p:sp>
+      <p:sp>
+        <p:nvSpPr>
+          <p:cNvPr id="8" name="Text 6"/>
+          <p:cNvSpPr/>
+          <p:nvPr/>
+        </p:nvSpPr>
+        <p:spPr>
+          <a:xfrm>
+            <a:off x="1645920" y="1737360"/>
+            <a:ext cx="6766560" cy="1645920"/>
+          </a:xfrm>
+          <a:prstGeom prst="rect">
+            <a:avLst/>
+          </a:prstGeom>
+          <a:noFill/>
+          <a:ln/>
+        </p:spPr>
+        <p:txBody>
+          <a:bodyPr wrap="square" rtlCol="0" anchor="t"/>
           <a:lstStyle/>
           <a:p>
             <a:pPr indent="0" marL="0">
               <a:buNone/>
             </a:pPr>
             <a:r>
-              <a:rPr lang="en-US" sz="1000" dirty="0">
+              <a:rPr lang="en-US" sz="1400" dirty="0">
                 <a:solidFill>
-                  <a:srgbClr val="667EEA"/>
+                  <a:srgbClr val="FFFFFF"/>
                 </a:solidFill>
                 <a:latin typeface="Arial" pitchFamily="34" charset="0"/>
                 <a:ea typeface="Arial" pitchFamily="34" charset="-122"/>
                 <a:cs typeface="Arial" pitchFamily="34" charset="-120"/>
               </a:rPr>
-              <a:t>www.educacomtalento.com.br</a:t>
-            </a:r>
-            <a:endParaRPr lang="en-US" sz="1000" dirty="0"/>
+              <a:t>&gt; **Esta atividade vai transformar seu espaço de estudo!**</a:t>
+            </a:r>
+            <a:endParaRPr lang="en-US" sz="1400" dirty="0"/>
+          </a:p>
+        </p:txBody>
+      </p:sp>
+      <p:sp>
+        <p:nvSpPr>
+          <p:cNvPr id="9" name="Shape 7"/>
+          <p:cNvSpPr/>
+          <p:nvPr/>
+        </p:nvSpPr>
+        <p:spPr>
+          <a:xfrm>
+            <a:off x="457200" y="3749040"/>
+            <a:ext cx="8229600" cy="640080"/>
+          </a:xfrm>
+          <a:prstGeom prst="roundRect">
+            <a:avLst/>
+          </a:prstGeom>
+          <a:solidFill>
+            <a:srgbClr val="1E3A5F"/>
+          </a:solidFill>
+          <a:ln w="12700">
+            <a:solidFill>
+              <a:srgbClr val="667EEA"/>
+            </a:solidFill>
+            <a:prstDash val="solid"/>
+          </a:ln>
+        </p:spPr>
+      </p:sp>
+      <p:sp>
+        <p:nvSpPr>
+          <p:cNvPr id="10" name="Text 8"/>
+          <p:cNvSpPr/>
+          <p:nvPr/>
+        </p:nvSpPr>
+        <p:spPr>
+          <a:xfrm>
+            <a:off x="457200" y="3886200"/>
+            <a:ext cx="8229600" cy="365760"/>
+          </a:xfrm>
+          <a:prstGeom prst="rect">
+            <a:avLst/>
+          </a:prstGeom>
+          <a:noFill/>
+          <a:ln/>
+        </p:spPr>
+        <p:txBody>
+          <a:bodyPr wrap="square" rtlCol="0" anchor="ctr"/>
+          <a:lstStyle/>
+          <a:p>
+            <a:pPr algn="ctr" indent="0" marL="0">
+              <a:buNone/>
+            </a:pPr>
+            <a:r>
+              <a:rPr lang="en-US" sz="1300" dirty="0">
+                <a:solidFill>
+                  <a:srgbClr val="FFFFFF"/>
+                </a:solidFill>
+                <a:latin typeface="Arial" pitchFamily="34" charset="0"/>
+                <a:ea typeface="Arial" pitchFamily="34" charset="-122"/>
+                <a:cs typeface="Arial" pitchFamily="34" charset="-120"/>
+              </a:rPr>
+              <a:t>📤 Envie na área de atividades do Moodle</a:t>
+            </a:r>
+            <a:endParaRPr lang="en-US" sz="1300" dirty="0"/>
           </a:p>
         </p:txBody>
       </p:sp>
       <p:pic>
         <p:nvPicPr>
-          <p:cNvPr id="13" name="Image 0" descr="preencoded.png">    </p:cNvPr>
+          <p:cNvPr id="12" name="Image 0" descr="preencoded.png">    </p:cNvPr>
           <p:cNvPicPr>
             <a:picLocks noChangeAspect="1"/>
           </p:cNvPicPr>
@@ -6442,8 +6777,8 @@
         </p:blipFill>
         <p:spPr>
           <a:xfrm>
-            <a:off x="6400800" y="3886200"/>
-            <a:ext cx="2286000" cy="914400"/>
+            <a:off x="7498080" y="4389120"/>
+            <a:ext cx="1371600" cy="548640"/>
           </a:xfrm>
           <a:prstGeom prst="rect">
             <a:avLst/>

</xml_diff>